<commit_message>
Presentación idea (Hay que Completar y falta estilo)
</commit_message>
<xml_diff>
--- a/Evidencias Grupales/Presentación.pptx
+++ b/Evidencias Grupales/Presentación.pptx
@@ -5,35 +5,42 @@
     <p:sldMasterId id="2147483648" r:id="rId1"/>
   </p:sldMasterIdLst>
   <p:sldIdLst>
-    <p:sldId id="262" r:id="rId2"/>
-    <p:sldId id="256" r:id="rId3"/>
-    <p:sldId id="257" r:id="rId4"/>
-    <p:sldId id="258" r:id="rId5"/>
-    <p:sldId id="259" r:id="rId6"/>
-    <p:sldId id="260" r:id="rId7"/>
+    <p:sldId id="268" r:id="rId2"/>
+    <p:sldId id="269" r:id="rId3"/>
+    <p:sldId id="262" r:id="rId4"/>
+    <p:sldId id="256" r:id="rId5"/>
+    <p:sldId id="257" r:id="rId6"/>
+    <p:sldId id="258" r:id="rId7"/>
+    <p:sldId id="259" r:id="rId8"/>
+    <p:sldId id="260" r:id="rId9"/>
+    <p:sldId id="267" r:id="rId10"/>
+    <p:sldId id="266" r:id="rId11"/>
+    <p:sldId id="263" r:id="rId12"/>
+    <p:sldId id="265" r:id="rId13"/>
+    <p:sldId id="264" r:id="rId14"/>
   </p:sldIdLst>
   <p:sldSz cx="18288000" cy="10287000"/>
   <p:notesSz cx="6858000" cy="9144000"/>
   <p:embeddedFontLst>
     <p:embeddedFont>
       <p:font typeface="Garet" panose="020B0604020202020204" charset="0"/>
-      <p:regular r:id="rId8"/>
+      <p:regular r:id="rId15"/>
     </p:embeddedFont>
     <p:embeddedFont>
       <p:font typeface="Garet Bold" panose="020B0604020202020204" charset="0"/>
-      <p:regular r:id="rId9"/>
+      <p:regular r:id="rId16"/>
     </p:embeddedFont>
     <p:embeddedFont>
       <p:font typeface="Garet Light" panose="020B0604020202020204" charset="0"/>
-      <p:regular r:id="rId10"/>
+      <p:regular r:id="rId17"/>
     </p:embeddedFont>
     <p:embeddedFont>
       <p:font typeface="Garet Ultra-Bold" panose="020B0604020202020204" charset="0"/>
-      <p:regular r:id="rId11"/>
+      <p:regular r:id="rId18"/>
     </p:embeddedFont>
     <p:embeddedFont>
       <p:font typeface="Open Sans" panose="020B0606030504020204" pitchFamily="34" charset="0"/>
-      <p:regular r:id="rId12"/>
+      <p:regular r:id="rId19"/>
     </p:embeddedFont>
   </p:embeddedFontLst>
   <p:defaultTextStyle>
@@ -3083,6 +3090,425 @@
       </p:grpSpPr>
       <p:sp>
         <p:nvSpPr>
+          <p:cNvPr id="2" name="Título 1">
+            <a:extLst>
+              <a:ext uri="{FF2B5EF4-FFF2-40B4-BE49-F238E27FC236}">
+                <a16:creationId xmlns:a16="http://schemas.microsoft.com/office/drawing/2014/main" id="{3F4B5973-0AAC-9AE5-39DC-4C27D45DB68C}"/>
+              </a:ext>
+            </a:extLst>
+          </p:cNvPr>
+          <p:cNvSpPr>
+            <a:spLocks noGrp="1"/>
+          </p:cNvSpPr>
+          <p:nvPr>
+            <p:ph type="ctrTitle"/>
+          </p:nvPr>
+        </p:nvSpPr>
+        <p:spPr/>
+        <p:txBody>
+          <a:bodyPr/>
+          <a:lstStyle/>
+          <a:p>
+            <a:r>
+              <a:rPr lang="es-ES" dirty="0"/>
+              <a:t>Nombre Caso</a:t>
+            </a:r>
+            <a:endParaRPr lang="es-CL" dirty="0"/>
+          </a:p>
+        </p:txBody>
+      </p:sp>
+      <p:sp>
+        <p:nvSpPr>
+          <p:cNvPr id="3" name="Subtítulo 2">
+            <a:extLst>
+              <a:ext uri="{FF2B5EF4-FFF2-40B4-BE49-F238E27FC236}">
+                <a16:creationId xmlns:a16="http://schemas.microsoft.com/office/drawing/2014/main" id="{C8A3181E-0D8D-FCA1-88A6-556294BD8786}"/>
+              </a:ext>
+            </a:extLst>
+          </p:cNvPr>
+          <p:cNvSpPr>
+            <a:spLocks noGrp="1"/>
+          </p:cNvSpPr>
+          <p:nvPr>
+            <p:ph type="subTitle" idx="1"/>
+          </p:nvPr>
+        </p:nvSpPr>
+        <p:spPr/>
+        <p:txBody>
+          <a:bodyPr/>
+          <a:lstStyle/>
+          <a:p>
+            <a:r>
+              <a:rPr lang="es-ES" dirty="0"/>
+              <a:t>Integrantes</a:t>
+            </a:r>
+            <a:endParaRPr lang="es-CL" dirty="0"/>
+          </a:p>
+        </p:txBody>
+      </p:sp>
+    </p:spTree>
+    <p:extLst>
+      <p:ext uri="{BB962C8B-B14F-4D97-AF65-F5344CB8AC3E}">
+        <p14:creationId xmlns:p14="http://schemas.microsoft.com/office/powerpoint/2010/main" val="1114946769"/>
+      </p:ext>
+    </p:extLst>
+  </p:cSld>
+  <p:clrMapOvr>
+    <a:masterClrMapping/>
+  </p:clrMapOvr>
+</p:sld>
+</file>
+
+<file path=ppt/slides/slide10.xml><?xml version="1.0" encoding="utf-8"?>
+<p:sld xmlns:a="http://schemas.openxmlformats.org/drawingml/2006/main" xmlns:r="http://schemas.openxmlformats.org/officeDocument/2006/relationships" xmlns:p="http://schemas.openxmlformats.org/presentationml/2006/main">
+  <p:cSld>
+    <p:spTree>
+      <p:nvGrpSpPr>
+        <p:cNvPr id="1" name=""/>
+        <p:cNvGrpSpPr/>
+        <p:nvPr/>
+      </p:nvGrpSpPr>
+      <p:grpSpPr>
+        <a:xfrm>
+          <a:off x="0" y="0"/>
+          <a:ext cx="0" cy="0"/>
+          <a:chOff x="0" y="0"/>
+          <a:chExt cx="0" cy="0"/>
+        </a:xfrm>
+      </p:grpSpPr>
+      <p:pic>
+        <p:nvPicPr>
+          <p:cNvPr id="3" name="Imagen 2">
+            <a:extLst>
+              <a:ext uri="{FF2B5EF4-FFF2-40B4-BE49-F238E27FC236}">
+                <a16:creationId xmlns:a16="http://schemas.microsoft.com/office/drawing/2014/main" id="{2E0E7933-41CF-8775-EFD8-C06AD0A48030}"/>
+              </a:ext>
+            </a:extLst>
+          </p:cNvPr>
+          <p:cNvPicPr>
+            <a:picLocks noChangeAspect="1"/>
+          </p:cNvPicPr>
+          <p:nvPr/>
+        </p:nvPicPr>
+        <p:blipFill>
+          <a:blip r:embed="rId2"/>
+          <a:stretch>
+            <a:fillRect/>
+          </a:stretch>
+        </p:blipFill>
+        <p:spPr>
+          <a:xfrm>
+            <a:off x="533400" y="0"/>
+            <a:ext cx="7241772" cy="10287000"/>
+          </a:xfrm>
+          <a:prstGeom prst="rect">
+            <a:avLst/>
+          </a:prstGeom>
+        </p:spPr>
+      </p:pic>
+    </p:spTree>
+    <p:extLst>
+      <p:ext uri="{BB962C8B-B14F-4D97-AF65-F5344CB8AC3E}">
+        <p14:creationId xmlns:p14="http://schemas.microsoft.com/office/powerpoint/2010/main" val="2678382873"/>
+      </p:ext>
+    </p:extLst>
+  </p:cSld>
+  <p:clrMapOvr>
+    <a:masterClrMapping/>
+  </p:clrMapOvr>
+</p:sld>
+</file>
+
+<file path=ppt/slides/slide11.xml><?xml version="1.0" encoding="utf-8"?>
+<p:sld xmlns:a="http://schemas.openxmlformats.org/drawingml/2006/main" xmlns:r="http://schemas.openxmlformats.org/officeDocument/2006/relationships" xmlns:p="http://schemas.openxmlformats.org/presentationml/2006/main">
+  <p:cSld>
+    <p:spTree>
+      <p:nvGrpSpPr>
+        <p:cNvPr id="1" name=""/>
+        <p:cNvGrpSpPr/>
+        <p:nvPr/>
+      </p:nvGrpSpPr>
+      <p:grpSpPr>
+        <a:xfrm>
+          <a:off x="0" y="0"/>
+          <a:ext cx="0" cy="0"/>
+          <a:chOff x="0" y="0"/>
+          <a:chExt cx="0" cy="0"/>
+        </a:xfrm>
+      </p:grpSpPr>
+      <p:pic>
+        <p:nvPicPr>
+          <p:cNvPr id="5" name="Imagen 4">
+            <a:extLst>
+              <a:ext uri="{FF2B5EF4-FFF2-40B4-BE49-F238E27FC236}">
+                <a16:creationId xmlns:a16="http://schemas.microsoft.com/office/drawing/2014/main" id="{F01FCD59-4127-6EC9-89BC-4CF11F995D9E}"/>
+              </a:ext>
+            </a:extLst>
+          </p:cNvPr>
+          <p:cNvPicPr>
+            <a:picLocks noChangeAspect="1"/>
+          </p:cNvPicPr>
+          <p:nvPr/>
+        </p:nvPicPr>
+        <p:blipFill>
+          <a:blip r:embed="rId2"/>
+          <a:stretch>
+            <a:fillRect/>
+          </a:stretch>
+        </p:blipFill>
+        <p:spPr>
+          <a:xfrm>
+            <a:off x="3124200" y="34089"/>
+            <a:ext cx="12357093" cy="9934206"/>
+          </a:xfrm>
+          <a:prstGeom prst="rect">
+            <a:avLst/>
+          </a:prstGeom>
+        </p:spPr>
+      </p:pic>
+    </p:spTree>
+    <p:extLst>
+      <p:ext uri="{BB962C8B-B14F-4D97-AF65-F5344CB8AC3E}">
+        <p14:creationId xmlns:p14="http://schemas.microsoft.com/office/powerpoint/2010/main" val="3938999162"/>
+      </p:ext>
+    </p:extLst>
+  </p:cSld>
+  <p:clrMapOvr>
+    <a:masterClrMapping/>
+  </p:clrMapOvr>
+</p:sld>
+</file>
+
+<file path=ppt/slides/slide12.xml><?xml version="1.0" encoding="utf-8"?>
+<p:sld xmlns:a="http://schemas.openxmlformats.org/drawingml/2006/main" xmlns:r="http://schemas.openxmlformats.org/officeDocument/2006/relationships" xmlns:p="http://schemas.openxmlformats.org/presentationml/2006/main">
+  <p:cSld>
+    <p:spTree>
+      <p:nvGrpSpPr>
+        <p:cNvPr id="1" name=""/>
+        <p:cNvGrpSpPr/>
+        <p:nvPr/>
+      </p:nvGrpSpPr>
+      <p:grpSpPr>
+        <a:xfrm>
+          <a:off x="0" y="0"/>
+          <a:ext cx="0" cy="0"/>
+          <a:chOff x="0" y="0"/>
+          <a:chExt cx="0" cy="0"/>
+        </a:xfrm>
+      </p:grpSpPr>
+      <p:pic>
+        <p:nvPicPr>
+          <p:cNvPr id="5" name="Imagen 4">
+            <a:extLst>
+              <a:ext uri="{FF2B5EF4-FFF2-40B4-BE49-F238E27FC236}">
+                <a16:creationId xmlns:a16="http://schemas.microsoft.com/office/drawing/2014/main" id="{F01FCD59-4127-6EC9-89BC-4CF11F995D9E}"/>
+              </a:ext>
+            </a:extLst>
+          </p:cNvPr>
+          <p:cNvPicPr>
+            <a:picLocks noChangeAspect="1"/>
+          </p:cNvPicPr>
+          <p:nvPr/>
+        </p:nvPicPr>
+        <p:blipFill>
+          <a:blip r:embed="rId2"/>
+          <a:stretch>
+            <a:fillRect/>
+          </a:stretch>
+        </p:blipFill>
+        <p:spPr>
+          <a:xfrm>
+            <a:off x="3124200" y="34089"/>
+            <a:ext cx="12357093" cy="9934206"/>
+          </a:xfrm>
+          <a:prstGeom prst="rect">
+            <a:avLst/>
+          </a:prstGeom>
+        </p:spPr>
+      </p:pic>
+    </p:spTree>
+    <p:extLst>
+      <p:ext uri="{BB962C8B-B14F-4D97-AF65-F5344CB8AC3E}">
+        <p14:creationId xmlns:p14="http://schemas.microsoft.com/office/powerpoint/2010/main" val="1722436470"/>
+      </p:ext>
+    </p:extLst>
+  </p:cSld>
+  <p:clrMapOvr>
+    <a:masterClrMapping/>
+  </p:clrMapOvr>
+</p:sld>
+</file>
+
+<file path=ppt/slides/slide13.xml><?xml version="1.0" encoding="utf-8"?>
+<p:sld xmlns:a="http://schemas.openxmlformats.org/drawingml/2006/main" xmlns:r="http://schemas.openxmlformats.org/officeDocument/2006/relationships" xmlns:p="http://schemas.openxmlformats.org/presentationml/2006/main">
+  <p:cSld>
+    <p:spTree>
+      <p:nvGrpSpPr>
+        <p:cNvPr id="1" name=""/>
+        <p:cNvGrpSpPr/>
+        <p:nvPr/>
+      </p:nvGrpSpPr>
+      <p:grpSpPr>
+        <a:xfrm>
+          <a:off x="0" y="0"/>
+          <a:ext cx="0" cy="0"/>
+          <a:chOff x="0" y="0"/>
+          <a:chExt cx="0" cy="0"/>
+        </a:xfrm>
+      </p:grpSpPr>
+      <p:pic>
+        <p:nvPicPr>
+          <p:cNvPr id="3" name="Imagen 2">
+            <a:extLst>
+              <a:ext uri="{FF2B5EF4-FFF2-40B4-BE49-F238E27FC236}">
+                <a16:creationId xmlns:a16="http://schemas.microsoft.com/office/drawing/2014/main" id="{1E4AE64E-2500-8943-85BC-65C8468E00EB}"/>
+              </a:ext>
+            </a:extLst>
+          </p:cNvPr>
+          <p:cNvPicPr>
+            <a:picLocks noChangeAspect="1"/>
+          </p:cNvPicPr>
+          <p:nvPr/>
+        </p:nvPicPr>
+        <p:blipFill>
+          <a:blip r:embed="rId2"/>
+          <a:stretch>
+            <a:fillRect/>
+          </a:stretch>
+        </p:blipFill>
+        <p:spPr>
+          <a:xfrm>
+            <a:off x="1827709" y="0"/>
+            <a:ext cx="14632582" cy="10287000"/>
+          </a:xfrm>
+          <a:prstGeom prst="rect">
+            <a:avLst/>
+          </a:prstGeom>
+        </p:spPr>
+      </p:pic>
+    </p:spTree>
+    <p:extLst>
+      <p:ext uri="{BB962C8B-B14F-4D97-AF65-F5344CB8AC3E}">
+        <p14:creationId xmlns:p14="http://schemas.microsoft.com/office/powerpoint/2010/main" val="2968663913"/>
+      </p:ext>
+    </p:extLst>
+  </p:cSld>
+  <p:clrMapOvr>
+    <a:masterClrMapping/>
+  </p:clrMapOvr>
+</p:sld>
+</file>
+
+<file path=ppt/slides/slide2.xml><?xml version="1.0" encoding="utf-8"?>
+<p:sld xmlns:a="http://schemas.openxmlformats.org/drawingml/2006/main" xmlns:r="http://schemas.openxmlformats.org/officeDocument/2006/relationships" xmlns:p="http://schemas.openxmlformats.org/presentationml/2006/main">
+  <p:cSld>
+    <p:spTree>
+      <p:nvGrpSpPr>
+        <p:cNvPr id="1" name=""/>
+        <p:cNvGrpSpPr/>
+        <p:nvPr/>
+      </p:nvGrpSpPr>
+      <p:grpSpPr>
+        <a:xfrm>
+          <a:off x="0" y="0"/>
+          <a:ext cx="0" cy="0"/>
+          <a:chOff x="0" y="0"/>
+          <a:chExt cx="0" cy="0"/>
+        </a:xfrm>
+      </p:grpSpPr>
+      <p:sp>
+        <p:nvSpPr>
+          <p:cNvPr id="2" name="Título 1">
+            <a:extLst>
+              <a:ext uri="{FF2B5EF4-FFF2-40B4-BE49-F238E27FC236}">
+                <a16:creationId xmlns:a16="http://schemas.microsoft.com/office/drawing/2014/main" id="{133C63A3-2BF7-B5D0-F3D8-7A8F19ADEC7E}"/>
+              </a:ext>
+            </a:extLst>
+          </p:cNvPr>
+          <p:cNvSpPr>
+            <a:spLocks noGrp="1"/>
+          </p:cNvSpPr>
+          <p:nvPr>
+            <p:ph type="title"/>
+          </p:nvPr>
+        </p:nvSpPr>
+        <p:spPr/>
+        <p:txBody>
+          <a:bodyPr/>
+          <a:lstStyle/>
+          <a:p>
+            <a:r>
+              <a:rPr lang="es-ES" dirty="0"/>
+              <a:t>Contexto</a:t>
+            </a:r>
+            <a:endParaRPr lang="es-CL" dirty="0"/>
+          </a:p>
+        </p:txBody>
+      </p:sp>
+      <p:sp>
+        <p:nvSpPr>
+          <p:cNvPr id="3" name="Marcador de contenido 2">
+            <a:extLst>
+              <a:ext uri="{FF2B5EF4-FFF2-40B4-BE49-F238E27FC236}">
+                <a16:creationId xmlns:a16="http://schemas.microsoft.com/office/drawing/2014/main" id="{D78DF312-3138-BD5F-EC8E-1042A0308E7F}"/>
+              </a:ext>
+            </a:extLst>
+          </p:cNvPr>
+          <p:cNvSpPr>
+            <a:spLocks noGrp="1"/>
+          </p:cNvSpPr>
+          <p:nvPr>
+            <p:ph idx="1"/>
+          </p:nvPr>
+        </p:nvSpPr>
+        <p:spPr/>
+        <p:txBody>
+          <a:bodyPr/>
+          <a:lstStyle/>
+          <a:p>
+            <a:pPr marL="0" indent="0">
+              <a:buNone/>
+            </a:pPr>
+            <a:r>
+              <a:rPr lang="es-ES" dirty="0"/>
+              <a:t>Descripción contexto</a:t>
+            </a:r>
+            <a:endParaRPr lang="es-CL" dirty="0"/>
+          </a:p>
+        </p:txBody>
+      </p:sp>
+    </p:spTree>
+    <p:extLst>
+      <p:ext uri="{BB962C8B-B14F-4D97-AF65-F5344CB8AC3E}">
+        <p14:creationId xmlns:p14="http://schemas.microsoft.com/office/powerpoint/2010/main" val="54038942"/>
+      </p:ext>
+    </p:extLst>
+  </p:cSld>
+  <p:clrMapOvr>
+    <a:masterClrMapping/>
+  </p:clrMapOvr>
+</p:sld>
+</file>
+
+<file path=ppt/slides/slide3.xml><?xml version="1.0" encoding="utf-8"?>
+<p:sld xmlns:a="http://schemas.openxmlformats.org/drawingml/2006/main" xmlns:r="http://schemas.openxmlformats.org/officeDocument/2006/relationships" xmlns:p="http://schemas.openxmlformats.org/presentationml/2006/main">
+  <p:cSld>
+    <p:spTree>
+      <p:nvGrpSpPr>
+        <p:cNvPr id="1" name=""/>
+        <p:cNvGrpSpPr/>
+        <p:nvPr/>
+      </p:nvGrpSpPr>
+      <p:grpSpPr>
+        <a:xfrm>
+          <a:off x="0" y="0"/>
+          <a:ext cx="0" cy="0"/>
+          <a:chOff x="0" y="0"/>
+          <a:chExt cx="0" cy="0"/>
+        </a:xfrm>
+      </p:grpSpPr>
+      <p:sp>
+        <p:nvSpPr>
           <p:cNvPr id="2" name="AutoShape 2"/>
           <p:cNvSpPr/>
           <p:nvPr/>
@@ -8482,845 +8908,6 @@
 </p:sld>
 </file>
 
-<file path=ppt/slides/slide2.xml><?xml version="1.0" encoding="utf-8"?>
-<p:sld xmlns:a="http://schemas.openxmlformats.org/drawingml/2006/main" xmlns:r="http://schemas.openxmlformats.org/officeDocument/2006/relationships" xmlns:p="http://schemas.openxmlformats.org/presentationml/2006/main">
-  <p:cSld>
-    <p:spTree>
-      <p:nvGrpSpPr>
-        <p:cNvPr id="1" name=""/>
-        <p:cNvGrpSpPr/>
-        <p:nvPr/>
-      </p:nvGrpSpPr>
-      <p:grpSpPr>
-        <a:xfrm>
-          <a:off x="0" y="0"/>
-          <a:ext cx="0" cy="0"/>
-          <a:chOff x="0" y="0"/>
-          <a:chExt cx="0" cy="0"/>
-        </a:xfrm>
-      </p:grpSpPr>
-      <p:sp>
-        <p:nvSpPr>
-          <p:cNvPr id="2" name="Freeform 2"/>
-          <p:cNvSpPr/>
-          <p:nvPr/>
-        </p:nvSpPr>
-        <p:spPr>
-          <a:xfrm>
-            <a:off x="0" y="91566"/>
-            <a:ext cx="18288000" cy="10103867"/>
-          </a:xfrm>
-          <a:custGeom>
-            <a:avLst/>
-            <a:gdLst/>
-            <a:ahLst/>
-            <a:cxnLst/>
-            <a:rect l="l" t="t" r="r" b="b"/>
-            <a:pathLst>
-              <a:path w="18288000" h="10103867">
-                <a:moveTo>
-                  <a:pt x="0" y="0"/>
-                </a:moveTo>
-                <a:lnTo>
-                  <a:pt x="18288000" y="0"/>
-                </a:lnTo>
-                <a:lnTo>
-                  <a:pt x="18288000" y="10103868"/>
-                </a:lnTo>
-                <a:lnTo>
-                  <a:pt x="0" y="10103868"/>
-                </a:lnTo>
-                <a:lnTo>
-                  <a:pt x="0" y="0"/>
-                </a:lnTo>
-                <a:close/>
-              </a:path>
-            </a:pathLst>
-          </a:custGeom>
-          <a:blipFill>
-            <a:blip r:embed="rId2"/>
-            <a:stretch>
-              <a:fillRect/>
-            </a:stretch>
-          </a:blipFill>
-        </p:spPr>
-        <p:txBody>
-          <a:bodyPr/>
-          <a:lstStyle/>
-          <a:p>
-            <a:endParaRPr lang="es-CL"/>
-          </a:p>
-        </p:txBody>
-      </p:sp>
-      <p:sp>
-        <p:nvSpPr>
-          <p:cNvPr id="3" name="TextBox 3"/>
-          <p:cNvSpPr txBox="1"/>
-          <p:nvPr/>
-        </p:nvSpPr>
-        <p:spPr>
-          <a:xfrm>
-            <a:off x="914024" y="1825296"/>
-            <a:ext cx="3353246" cy="2380615"/>
-          </a:xfrm>
-          <a:prstGeom prst="rect">
-            <a:avLst/>
-          </a:prstGeom>
-        </p:spPr>
-        <p:txBody>
-          <a:bodyPr lIns="0" tIns="0" rIns="0" bIns="0" rtlCol="0" anchor="t">
-            <a:spAutoFit/>
-          </a:bodyPr>
-          <a:lstStyle/>
-          <a:p>
-            <a:pPr algn="l">
-              <a:lnSpc>
-                <a:spcPts val="4759"/>
-              </a:lnSpc>
-            </a:pPr>
-            <a:r>
-              <a:rPr lang="en-US" sz="3399">
-                <a:solidFill>
-                  <a:srgbClr val="000000"/>
-                </a:solidFill>
-                <a:latin typeface="Open Sans"/>
-                <a:ea typeface="Open Sans"/>
-                <a:cs typeface="Open Sans"/>
-                <a:sym typeface="Open Sans"/>
-              </a:rPr>
-              <a:t>Intuitivo</a:t>
-            </a:r>
-          </a:p>
-          <a:p>
-            <a:pPr algn="l">
-              <a:lnSpc>
-                <a:spcPts val="4759"/>
-              </a:lnSpc>
-            </a:pPr>
-            <a:r>
-              <a:rPr lang="en-US" sz="3399">
-                <a:solidFill>
-                  <a:srgbClr val="000000"/>
-                </a:solidFill>
-                <a:latin typeface="Open Sans"/>
-                <a:ea typeface="Open Sans"/>
-                <a:cs typeface="Open Sans"/>
-                <a:sym typeface="Open Sans"/>
-              </a:rPr>
-              <a:t>Responsive</a:t>
-            </a:r>
-          </a:p>
-          <a:p>
-            <a:pPr algn="l">
-              <a:lnSpc>
-                <a:spcPts val="4759"/>
-              </a:lnSpc>
-            </a:pPr>
-            <a:r>
-              <a:rPr lang="en-US" sz="3399">
-                <a:solidFill>
-                  <a:srgbClr val="000000"/>
-                </a:solidFill>
-                <a:latin typeface="Open Sans"/>
-                <a:ea typeface="Open Sans"/>
-                <a:cs typeface="Open Sans"/>
-                <a:sym typeface="Open Sans"/>
-              </a:rPr>
-              <a:t>Gratuito para UF</a:t>
-            </a:r>
-          </a:p>
-          <a:p>
-            <a:pPr algn="l">
-              <a:lnSpc>
-                <a:spcPts val="4759"/>
-              </a:lnSpc>
-            </a:pPr>
-            <a:endParaRPr lang="en-US" sz="3399">
-              <a:solidFill>
-                <a:srgbClr val="000000"/>
-              </a:solidFill>
-              <a:latin typeface="Open Sans"/>
-              <a:ea typeface="Open Sans"/>
-              <a:cs typeface="Open Sans"/>
-              <a:sym typeface="Open Sans"/>
-            </a:endParaRPr>
-          </a:p>
-        </p:txBody>
-      </p:sp>
-      <p:sp>
-        <p:nvSpPr>
-          <p:cNvPr id="4" name="TextBox 4"/>
-          <p:cNvSpPr txBox="1"/>
-          <p:nvPr/>
-        </p:nvSpPr>
-        <p:spPr>
-          <a:xfrm>
-            <a:off x="5192790" y="1868476"/>
-            <a:ext cx="1583085" cy="1180465"/>
-          </a:xfrm>
-          <a:prstGeom prst="rect">
-            <a:avLst/>
-          </a:prstGeom>
-        </p:spPr>
-        <p:txBody>
-          <a:bodyPr lIns="0" tIns="0" rIns="0" bIns="0" rtlCol="0" anchor="t">
-            <a:spAutoFit/>
-          </a:bodyPr>
-          <a:lstStyle/>
-          <a:p>
-            <a:pPr algn="ctr">
-              <a:lnSpc>
-                <a:spcPts val="4759"/>
-              </a:lnSpc>
-            </a:pPr>
-            <a:r>
-              <a:rPr lang="en-US" sz="3399">
-                <a:solidFill>
-                  <a:srgbClr val="000000"/>
-                </a:solidFill>
-                <a:latin typeface="Open Sans"/>
-                <a:ea typeface="Open Sans"/>
-                <a:cs typeface="Open Sans"/>
-                <a:sym typeface="Open Sans"/>
-              </a:rPr>
-              <a:t>En linea</a:t>
-            </a:r>
-          </a:p>
-          <a:p>
-            <a:pPr algn="ctr">
-              <a:lnSpc>
-                <a:spcPts val="4759"/>
-              </a:lnSpc>
-            </a:pPr>
-            <a:endParaRPr lang="en-US" sz="3399">
-              <a:solidFill>
-                <a:srgbClr val="000000"/>
-              </a:solidFill>
-              <a:latin typeface="Open Sans"/>
-              <a:ea typeface="Open Sans"/>
-              <a:cs typeface="Open Sans"/>
-              <a:sym typeface="Open Sans"/>
-            </a:endParaRPr>
-          </a:p>
-        </p:txBody>
-      </p:sp>
-      <p:sp>
-        <p:nvSpPr>
-          <p:cNvPr id="5" name="TextBox 5"/>
-          <p:cNvSpPr txBox="1"/>
-          <p:nvPr/>
-        </p:nvSpPr>
-        <p:spPr>
-          <a:xfrm>
-            <a:off x="560046" y="6347222"/>
-            <a:ext cx="3519961" cy="3339381"/>
-          </a:xfrm>
-          <a:prstGeom prst="rect">
-            <a:avLst/>
-          </a:prstGeom>
-        </p:spPr>
-        <p:txBody>
-          <a:bodyPr lIns="0" tIns="0" rIns="0" bIns="0" rtlCol="0" anchor="t">
-            <a:spAutoFit/>
-          </a:bodyPr>
-          <a:lstStyle/>
-          <a:p>
-            <a:pPr algn="ctr">
-              <a:lnSpc>
-                <a:spcPts val="3797"/>
-              </a:lnSpc>
-            </a:pPr>
-            <a:r>
-              <a:rPr lang="en-US" sz="2712">
-                <a:solidFill>
-                  <a:srgbClr val="000000"/>
-                </a:solidFill>
-                <a:latin typeface="Open Sans"/>
-                <a:ea typeface="Open Sans"/>
-                <a:cs typeface="Open Sans"/>
-                <a:sym typeface="Open Sans"/>
-              </a:rPr>
-              <a:t>Ver novedades dentro de la villa</a:t>
-            </a:r>
-          </a:p>
-          <a:p>
-            <a:pPr algn="ctr">
-              <a:lnSpc>
-                <a:spcPts val="3797"/>
-              </a:lnSpc>
-            </a:pPr>
-            <a:r>
-              <a:rPr lang="en-US" sz="2712">
-                <a:solidFill>
-                  <a:srgbClr val="000000"/>
-                </a:solidFill>
-                <a:latin typeface="Open Sans"/>
-                <a:ea typeface="Open Sans"/>
-                <a:cs typeface="Open Sans"/>
-                <a:sym typeface="Open Sans"/>
-              </a:rPr>
-              <a:t>Mandar solicitudes</a:t>
-            </a:r>
-          </a:p>
-          <a:p>
-            <a:pPr algn="ctr">
-              <a:lnSpc>
-                <a:spcPts val="3797"/>
-              </a:lnSpc>
-            </a:pPr>
-            <a:r>
-              <a:rPr lang="en-US" sz="2712">
-                <a:solidFill>
-                  <a:srgbClr val="000000"/>
-                </a:solidFill>
-                <a:latin typeface="Open Sans"/>
-                <a:ea typeface="Open Sans"/>
-                <a:cs typeface="Open Sans"/>
-                <a:sym typeface="Open Sans"/>
-              </a:rPr>
-              <a:t>Sacar certificados de residencia</a:t>
-            </a:r>
-          </a:p>
-          <a:p>
-            <a:pPr algn="ctr">
-              <a:lnSpc>
-                <a:spcPts val="3797"/>
-              </a:lnSpc>
-            </a:pPr>
-            <a:r>
-              <a:rPr lang="en-US" sz="2712">
-                <a:solidFill>
-                  <a:srgbClr val="000000"/>
-                </a:solidFill>
-                <a:latin typeface="Open Sans"/>
-                <a:ea typeface="Open Sans"/>
-                <a:cs typeface="Open Sans"/>
-                <a:sym typeface="Open Sans"/>
-              </a:rPr>
-              <a:t>Inscripciones</a:t>
-            </a:r>
-          </a:p>
-          <a:p>
-            <a:pPr algn="ctr">
-              <a:lnSpc>
-                <a:spcPts val="3797"/>
-              </a:lnSpc>
-            </a:pPr>
-            <a:r>
-              <a:rPr lang="en-US" sz="2712">
-                <a:solidFill>
-                  <a:srgbClr val="000000"/>
-                </a:solidFill>
-                <a:latin typeface="Open Sans"/>
-                <a:ea typeface="Open Sans"/>
-                <a:cs typeface="Open Sans"/>
-                <a:sym typeface="Open Sans"/>
-              </a:rPr>
-              <a:t>Reservas</a:t>
-            </a:r>
-          </a:p>
-        </p:txBody>
-      </p:sp>
-      <p:sp>
-        <p:nvSpPr>
-          <p:cNvPr id="6" name="TextBox 6"/>
-          <p:cNvSpPr txBox="1"/>
-          <p:nvPr/>
-        </p:nvSpPr>
-        <p:spPr>
-          <a:xfrm>
-            <a:off x="5192790" y="2425371"/>
-            <a:ext cx="4243685" cy="1180465"/>
-          </a:xfrm>
-          <a:prstGeom prst="rect">
-            <a:avLst/>
-          </a:prstGeom>
-        </p:spPr>
-        <p:txBody>
-          <a:bodyPr lIns="0" tIns="0" rIns="0" bIns="0" rtlCol="0" anchor="t">
-            <a:spAutoFit/>
-          </a:bodyPr>
-          <a:lstStyle/>
-          <a:p>
-            <a:pPr algn="ctr">
-              <a:lnSpc>
-                <a:spcPts val="4759"/>
-              </a:lnSpc>
-            </a:pPr>
-            <a:r>
-              <a:rPr lang="en-US" sz="3399">
-                <a:solidFill>
-                  <a:srgbClr val="000000"/>
-                </a:solidFill>
-                <a:latin typeface="Open Sans"/>
-                <a:ea typeface="Open Sans"/>
-                <a:cs typeface="Open Sans"/>
-                <a:sym typeface="Open Sans"/>
-              </a:rPr>
-              <a:t>chat grupal de la villa</a:t>
-            </a:r>
-          </a:p>
-          <a:p>
-            <a:pPr algn="ctr">
-              <a:lnSpc>
-                <a:spcPts val="4759"/>
-              </a:lnSpc>
-            </a:pPr>
-            <a:endParaRPr lang="en-US" sz="3399">
-              <a:solidFill>
-                <a:srgbClr val="000000"/>
-              </a:solidFill>
-              <a:latin typeface="Open Sans"/>
-              <a:ea typeface="Open Sans"/>
-              <a:cs typeface="Open Sans"/>
-              <a:sym typeface="Open Sans"/>
-            </a:endParaRPr>
-          </a:p>
-        </p:txBody>
-      </p:sp>
-    </p:spTree>
-  </p:cSld>
-  <p:clrMapOvr>
-    <a:masterClrMapping/>
-  </p:clrMapOvr>
-</p:sld>
-</file>
-
-<file path=ppt/slides/slide3.xml><?xml version="1.0" encoding="utf-8"?>
-<p:sld xmlns:a="http://schemas.openxmlformats.org/drawingml/2006/main" xmlns:r="http://schemas.openxmlformats.org/officeDocument/2006/relationships" xmlns:p="http://schemas.openxmlformats.org/presentationml/2006/main">
-  <p:cSld>
-    <p:spTree>
-      <p:nvGrpSpPr>
-        <p:cNvPr id="1" name=""/>
-        <p:cNvGrpSpPr/>
-        <p:nvPr/>
-      </p:nvGrpSpPr>
-      <p:grpSpPr>
-        <a:xfrm>
-          <a:off x="0" y="0"/>
-          <a:ext cx="0" cy="0"/>
-          <a:chOff x="0" y="0"/>
-          <a:chExt cx="0" cy="0"/>
-        </a:xfrm>
-      </p:grpSpPr>
-      <p:sp>
-        <p:nvSpPr>
-          <p:cNvPr id="2" name="TextBox 2"/>
-          <p:cNvSpPr txBox="1"/>
-          <p:nvPr/>
-        </p:nvSpPr>
-        <p:spPr>
-          <a:xfrm>
-            <a:off x="1028700" y="1307467"/>
-            <a:ext cx="16230600" cy="12575401"/>
-          </a:xfrm>
-          <a:prstGeom prst="rect">
-            <a:avLst/>
-          </a:prstGeom>
-        </p:spPr>
-        <p:txBody>
-          <a:bodyPr lIns="0" tIns="0" rIns="0" bIns="0" rtlCol="0" anchor="t">
-            <a:spAutoFit/>
-          </a:bodyPr>
-          <a:lstStyle/>
-          <a:p>
-            <a:pPr algn="l">
-              <a:lnSpc>
-                <a:spcPts val="4539"/>
-              </a:lnSpc>
-            </a:pPr>
-            <a:r>
-              <a:rPr lang="en-US" sz="3242">
-                <a:solidFill>
-                  <a:srgbClr val="000000"/>
-                </a:solidFill>
-                <a:latin typeface="Open Sans"/>
-                <a:ea typeface="Open Sans"/>
-                <a:cs typeface="Open Sans"/>
-                <a:sym typeface="Open Sans"/>
-              </a:rPr>
-              <a:t>Objetivo: </a:t>
-            </a:r>
-          </a:p>
-          <a:p>
-            <a:pPr algn="l">
-              <a:lnSpc>
-                <a:spcPts val="4539"/>
-              </a:lnSpc>
-            </a:pPr>
-            <a:r>
-              <a:rPr lang="en-US" sz="3242">
-                <a:solidFill>
-                  <a:srgbClr val="000000"/>
-                </a:solidFill>
-                <a:latin typeface="Open Sans"/>
-                <a:ea typeface="Open Sans"/>
-                <a:cs typeface="Open Sans"/>
-                <a:sym typeface="Open Sans"/>
-              </a:rPr>
-              <a:t>Que genere beneficios monetarios para la empresa.</a:t>
-            </a:r>
-          </a:p>
-          <a:p>
-            <a:pPr algn="l">
-              <a:lnSpc>
-                <a:spcPts val="4539"/>
-              </a:lnSpc>
-            </a:pPr>
-            <a:r>
-              <a:rPr lang="en-US" sz="3242">
-                <a:solidFill>
-                  <a:srgbClr val="000000"/>
-                </a:solidFill>
-                <a:latin typeface="Open Sans"/>
-                <a:ea typeface="Open Sans"/>
-                <a:cs typeface="Open Sans"/>
-                <a:sym typeface="Open Sans"/>
-              </a:rPr>
-              <a:t>Agilizar lo tramites de los usuarios</a:t>
-            </a:r>
-          </a:p>
-          <a:p>
-            <a:pPr algn="l">
-              <a:lnSpc>
-                <a:spcPts val="4539"/>
-              </a:lnSpc>
-            </a:pPr>
-            <a:r>
-              <a:rPr lang="en-US" sz="3242">
-                <a:solidFill>
-                  <a:srgbClr val="000000"/>
-                </a:solidFill>
-                <a:latin typeface="Open Sans"/>
-                <a:ea typeface="Open Sans"/>
-                <a:cs typeface="Open Sans"/>
-                <a:sym typeface="Open Sans"/>
-              </a:rPr>
-              <a:t> </a:t>
-            </a:r>
-          </a:p>
-          <a:p>
-            <a:pPr algn="l">
-              <a:lnSpc>
-                <a:spcPts val="4539"/>
-              </a:lnSpc>
-            </a:pPr>
-            <a:endParaRPr lang="en-US" sz="3242">
-              <a:solidFill>
-                <a:srgbClr val="000000"/>
-              </a:solidFill>
-              <a:latin typeface="Open Sans"/>
-              <a:ea typeface="Open Sans"/>
-              <a:cs typeface="Open Sans"/>
-              <a:sym typeface="Open Sans"/>
-            </a:endParaRPr>
-          </a:p>
-          <a:p>
-            <a:pPr algn="l">
-              <a:lnSpc>
-                <a:spcPts val="4539"/>
-              </a:lnSpc>
-            </a:pPr>
-            <a:r>
-              <a:rPr lang="en-US" sz="3242">
-                <a:solidFill>
-                  <a:srgbClr val="000000"/>
-                </a:solidFill>
-                <a:latin typeface="Open Sans"/>
-                <a:ea typeface="Open Sans"/>
-                <a:cs typeface="Open Sans"/>
-                <a:sym typeface="Open Sans"/>
-              </a:rPr>
-              <a:t>Grupo de negocio:</a:t>
-            </a:r>
-          </a:p>
-          <a:p>
-            <a:pPr algn="l">
-              <a:lnSpc>
-                <a:spcPts val="4539"/>
-              </a:lnSpc>
-            </a:pPr>
-            <a:r>
-              <a:rPr lang="en-US" sz="3242">
-                <a:solidFill>
-                  <a:srgbClr val="000000"/>
-                </a:solidFill>
-                <a:latin typeface="Open Sans"/>
-                <a:ea typeface="Open Sans"/>
-                <a:cs typeface="Open Sans"/>
-                <a:sym typeface="Open Sans"/>
-              </a:rPr>
-              <a:t>Conseguir el maximo beneficio posible en el menor tiempo posible</a:t>
-            </a:r>
-          </a:p>
-          <a:p>
-            <a:pPr algn="l">
-              <a:lnSpc>
-                <a:spcPts val="4539"/>
-              </a:lnSpc>
-            </a:pPr>
-            <a:r>
-              <a:rPr lang="en-US" sz="3242">
-                <a:solidFill>
-                  <a:srgbClr val="000000"/>
-                </a:solidFill>
-                <a:latin typeface="Open Sans"/>
-                <a:ea typeface="Open Sans"/>
-                <a:cs typeface="Open Sans"/>
-                <a:sym typeface="Open Sans"/>
-              </a:rPr>
-              <a:t>Que genere ganancias a través de los certificados y/o con ads dentro de la web</a:t>
-            </a:r>
-          </a:p>
-          <a:p>
-            <a:pPr algn="l">
-              <a:lnSpc>
-                <a:spcPts val="4539"/>
-              </a:lnSpc>
-            </a:pPr>
-            <a:r>
-              <a:rPr lang="en-US" sz="3242">
-                <a:solidFill>
-                  <a:srgbClr val="000000"/>
-                </a:solidFill>
-                <a:latin typeface="Open Sans"/>
-                <a:ea typeface="Open Sans"/>
-                <a:cs typeface="Open Sans"/>
-                <a:sym typeface="Open Sans"/>
-              </a:rPr>
-              <a:t>Que llegue a varias comunas </a:t>
-            </a:r>
-          </a:p>
-          <a:p>
-            <a:pPr algn="l">
-              <a:lnSpc>
-                <a:spcPts val="4539"/>
-              </a:lnSpc>
-            </a:pPr>
-            <a:endParaRPr lang="en-US" sz="3242">
-              <a:solidFill>
-                <a:srgbClr val="000000"/>
-              </a:solidFill>
-              <a:latin typeface="Open Sans"/>
-              <a:ea typeface="Open Sans"/>
-              <a:cs typeface="Open Sans"/>
-              <a:sym typeface="Open Sans"/>
-            </a:endParaRPr>
-          </a:p>
-          <a:p>
-            <a:pPr algn="l">
-              <a:lnSpc>
-                <a:spcPts val="4539"/>
-              </a:lnSpc>
-            </a:pPr>
-            <a:r>
-              <a:rPr lang="en-US" sz="3242">
-                <a:solidFill>
-                  <a:srgbClr val="000000"/>
-                </a:solidFill>
-                <a:latin typeface="Open Sans"/>
-                <a:ea typeface="Open Sans"/>
-                <a:cs typeface="Open Sans"/>
-                <a:sym typeface="Open Sans"/>
-              </a:rPr>
-              <a:t>Grupo de cumplir las necesidades para los usuarios finales</a:t>
-            </a:r>
-          </a:p>
-          <a:p>
-            <a:pPr algn="l">
-              <a:lnSpc>
-                <a:spcPts val="4539"/>
-              </a:lnSpc>
-            </a:pPr>
-            <a:r>
-              <a:rPr lang="en-US" sz="3242">
-                <a:solidFill>
-                  <a:srgbClr val="000000"/>
-                </a:solidFill>
-                <a:latin typeface="Open Sans"/>
-                <a:ea typeface="Open Sans"/>
-                <a:cs typeface="Open Sans"/>
-                <a:sym typeface="Open Sans"/>
-              </a:rPr>
-              <a:t>Cubrir las necesidades de los clientes.</a:t>
-            </a:r>
-          </a:p>
-          <a:p>
-            <a:pPr algn="l">
-              <a:lnSpc>
-                <a:spcPts val="4539"/>
-              </a:lnSpc>
-            </a:pPr>
-            <a:r>
-              <a:rPr lang="en-US" sz="3242">
-                <a:solidFill>
-                  <a:srgbClr val="000000"/>
-                </a:solidFill>
-                <a:latin typeface="Open Sans"/>
-                <a:ea typeface="Open Sans"/>
-                <a:cs typeface="Open Sans"/>
-                <a:sym typeface="Open Sans"/>
-              </a:rPr>
-              <a:t>Facilitar la comunicación de los usuarios.</a:t>
-            </a:r>
-          </a:p>
-          <a:p>
-            <a:pPr algn="l">
-              <a:lnSpc>
-                <a:spcPts val="4539"/>
-              </a:lnSpc>
-            </a:pPr>
-            <a:endParaRPr lang="en-US" sz="3242">
-              <a:solidFill>
-                <a:srgbClr val="000000"/>
-              </a:solidFill>
-              <a:latin typeface="Open Sans"/>
-              <a:ea typeface="Open Sans"/>
-              <a:cs typeface="Open Sans"/>
-              <a:sym typeface="Open Sans"/>
-            </a:endParaRPr>
-          </a:p>
-          <a:p>
-            <a:pPr algn="l">
-              <a:lnSpc>
-                <a:spcPts val="4539"/>
-              </a:lnSpc>
-            </a:pPr>
-            <a:endParaRPr lang="en-US" sz="3242">
-              <a:solidFill>
-                <a:srgbClr val="000000"/>
-              </a:solidFill>
-              <a:latin typeface="Open Sans"/>
-              <a:ea typeface="Open Sans"/>
-              <a:cs typeface="Open Sans"/>
-              <a:sym typeface="Open Sans"/>
-            </a:endParaRPr>
-          </a:p>
-          <a:p>
-            <a:pPr algn="l">
-              <a:lnSpc>
-                <a:spcPts val="4539"/>
-              </a:lnSpc>
-            </a:pPr>
-            <a:endParaRPr lang="en-US" sz="3242">
-              <a:solidFill>
-                <a:srgbClr val="000000"/>
-              </a:solidFill>
-              <a:latin typeface="Open Sans"/>
-              <a:ea typeface="Open Sans"/>
-              <a:cs typeface="Open Sans"/>
-              <a:sym typeface="Open Sans"/>
-            </a:endParaRPr>
-          </a:p>
-          <a:p>
-            <a:pPr algn="l">
-              <a:lnSpc>
-                <a:spcPts val="4539"/>
-              </a:lnSpc>
-            </a:pPr>
-            <a:endParaRPr lang="en-US" sz="3242">
-              <a:solidFill>
-                <a:srgbClr val="000000"/>
-              </a:solidFill>
-              <a:latin typeface="Open Sans"/>
-              <a:ea typeface="Open Sans"/>
-              <a:cs typeface="Open Sans"/>
-              <a:sym typeface="Open Sans"/>
-            </a:endParaRPr>
-          </a:p>
-          <a:p>
-            <a:pPr algn="l">
-              <a:lnSpc>
-                <a:spcPts val="4539"/>
-              </a:lnSpc>
-            </a:pPr>
-            <a:endParaRPr lang="en-US" sz="3242">
-              <a:solidFill>
-                <a:srgbClr val="000000"/>
-              </a:solidFill>
-              <a:latin typeface="Open Sans"/>
-              <a:ea typeface="Open Sans"/>
-              <a:cs typeface="Open Sans"/>
-              <a:sym typeface="Open Sans"/>
-            </a:endParaRPr>
-          </a:p>
-          <a:p>
-            <a:pPr algn="l">
-              <a:lnSpc>
-                <a:spcPts val="4539"/>
-              </a:lnSpc>
-            </a:pPr>
-            <a:endParaRPr lang="en-US" sz="3242">
-              <a:solidFill>
-                <a:srgbClr val="000000"/>
-              </a:solidFill>
-              <a:latin typeface="Open Sans"/>
-              <a:ea typeface="Open Sans"/>
-              <a:cs typeface="Open Sans"/>
-              <a:sym typeface="Open Sans"/>
-            </a:endParaRPr>
-          </a:p>
-          <a:p>
-            <a:pPr algn="l">
-              <a:lnSpc>
-                <a:spcPts val="4539"/>
-              </a:lnSpc>
-            </a:pPr>
-            <a:endParaRPr lang="en-US" sz="3242">
-              <a:solidFill>
-                <a:srgbClr val="000000"/>
-              </a:solidFill>
-              <a:latin typeface="Open Sans"/>
-              <a:ea typeface="Open Sans"/>
-              <a:cs typeface="Open Sans"/>
-              <a:sym typeface="Open Sans"/>
-            </a:endParaRPr>
-          </a:p>
-          <a:p>
-            <a:pPr algn="l">
-              <a:lnSpc>
-                <a:spcPts val="4539"/>
-              </a:lnSpc>
-            </a:pPr>
-            <a:endParaRPr lang="en-US" sz="3242">
-              <a:solidFill>
-                <a:srgbClr val="000000"/>
-              </a:solidFill>
-              <a:latin typeface="Open Sans"/>
-              <a:ea typeface="Open Sans"/>
-              <a:cs typeface="Open Sans"/>
-              <a:sym typeface="Open Sans"/>
-            </a:endParaRPr>
-          </a:p>
-          <a:p>
-            <a:pPr algn="l">
-              <a:lnSpc>
-                <a:spcPts val="4539"/>
-              </a:lnSpc>
-            </a:pPr>
-            <a:r>
-              <a:rPr lang="en-US" sz="3242">
-                <a:solidFill>
-                  <a:srgbClr val="000000"/>
-                </a:solidFill>
-                <a:latin typeface="Open Sans"/>
-                <a:ea typeface="Open Sans"/>
-                <a:cs typeface="Open Sans"/>
-                <a:sym typeface="Open Sans"/>
-              </a:rPr>
-              <a:t> </a:t>
-            </a:r>
-          </a:p>
-        </p:txBody>
-      </p:sp>
-    </p:spTree>
-  </p:cSld>
-  <p:clrMapOvr>
-    <a:masterClrMapping/>
-  </p:clrMapOvr>
-</p:sld>
-</file>
-
 <file path=ppt/slides/slide4.xml><?xml version="1.0" encoding="utf-8"?>
 <p:sld xmlns:a="http://schemas.openxmlformats.org/drawingml/2006/main" xmlns:r="http://schemas.openxmlformats.org/officeDocument/2006/relationships" xmlns:p="http://schemas.openxmlformats.org/presentationml/2006/main">
   <p:cSld>
@@ -9340,76 +8927,14 @@
       </p:grpSpPr>
       <p:sp>
         <p:nvSpPr>
-          <p:cNvPr id="2" name="AutoShape 2"/>
+          <p:cNvPr id="2" name="Freeform 2"/>
           <p:cNvSpPr/>
           <p:nvPr/>
         </p:nvSpPr>
         <p:spPr>
-          <a:xfrm flipV="1">
-            <a:off x="0" y="5143500"/>
-            <a:ext cx="18288000" cy="0"/>
-          </a:xfrm>
-          <a:prstGeom prst="line">
-            <a:avLst/>
-          </a:prstGeom>
-          <a:ln w="38100" cap="flat">
-            <a:solidFill>
-              <a:srgbClr val="000000"/>
-            </a:solidFill>
-            <a:prstDash val="solid"/>
-            <a:headEnd type="none" w="sm" len="sm"/>
-            <a:tailEnd type="none" w="sm" len="sm"/>
-          </a:ln>
-        </p:spPr>
-        <p:txBody>
-          <a:bodyPr/>
-          <a:lstStyle/>
-          <a:p>
-            <a:endParaRPr lang="es-CL"/>
-          </a:p>
-        </p:txBody>
-      </p:sp>
-      <p:sp>
-        <p:nvSpPr>
-          <p:cNvPr id="3" name="AutoShape 3"/>
-          <p:cNvSpPr/>
-          <p:nvPr/>
-        </p:nvSpPr>
-        <p:spPr>
-          <a:xfrm flipV="1">
-            <a:off x="9124950" y="0"/>
-            <a:ext cx="19050" cy="10287000"/>
-          </a:xfrm>
-          <a:prstGeom prst="line">
-            <a:avLst/>
-          </a:prstGeom>
-          <a:ln w="38100" cap="flat">
-            <a:solidFill>
-              <a:srgbClr val="000000"/>
-            </a:solidFill>
-            <a:prstDash val="solid"/>
-            <a:headEnd type="none" w="sm" len="sm"/>
-            <a:tailEnd type="none" w="sm" len="sm"/>
-          </a:ln>
-        </p:spPr>
-        <p:txBody>
-          <a:bodyPr/>
-          <a:lstStyle/>
-          <a:p>
-            <a:endParaRPr lang="es-CL"/>
-          </a:p>
-        </p:txBody>
-      </p:sp>
-      <p:sp>
-        <p:nvSpPr>
-          <p:cNvPr id="4" name="Freeform 4"/>
-          <p:cNvSpPr/>
-          <p:nvPr/>
-        </p:nvSpPr>
-        <p:spPr>
-          <a:xfrm>
-            <a:off x="1028700" y="1210803"/>
-            <a:ext cx="6726942" cy="3901627"/>
+          <a:xfrm>
+            <a:off x="292475" y="213212"/>
+            <a:ext cx="18288000" cy="10103867"/>
           </a:xfrm>
           <a:custGeom>
             <a:avLst/>
@@ -9418,18 +8943,18 @@
             <a:cxnLst/>
             <a:rect l="l" t="t" r="r" b="b"/>
             <a:pathLst>
-              <a:path w="6726942" h="3901627">
+              <a:path w="18288000" h="10103867">
                 <a:moveTo>
                   <a:pt x="0" y="0"/>
                 </a:moveTo>
                 <a:lnTo>
-                  <a:pt x="6726942" y="0"/>
-                </a:lnTo>
-                <a:lnTo>
-                  <a:pt x="6726942" y="3901627"/>
-                </a:lnTo>
-                <a:lnTo>
-                  <a:pt x="0" y="3901627"/>
+                  <a:pt x="18288000" y="0"/>
+                </a:lnTo>
+                <a:lnTo>
+                  <a:pt x="18288000" y="10103868"/>
+                </a:lnTo>
+                <a:lnTo>
+                  <a:pt x="0" y="10103868"/>
                 </a:lnTo>
                 <a:lnTo>
                   <a:pt x="0" y="0"/>
@@ -9455,14 +8980,14 @@
       </p:sp>
       <p:sp>
         <p:nvSpPr>
-          <p:cNvPr id="5" name="TextBox 5"/>
+          <p:cNvPr id="3" name="TextBox 3"/>
           <p:cNvSpPr txBox="1"/>
           <p:nvPr/>
         </p:nvSpPr>
         <p:spPr>
           <a:xfrm>
-            <a:off x="2999070" y="164555"/>
-            <a:ext cx="2787402" cy="580390"/>
+            <a:off x="914024" y="1825296"/>
+            <a:ext cx="3353246" cy="2380615"/>
           </a:xfrm>
           <a:prstGeom prst="rect">
             <a:avLst/>
@@ -9474,7 +8999,7 @@
           </a:bodyPr>
           <a:lstStyle/>
           <a:p>
-            <a:pPr algn="ctr">
+            <a:pPr algn="l">
               <a:lnSpc>
                 <a:spcPts val="4759"/>
               </a:lnSpc>
@@ -9489,33 +9014,11 @@
                 <a:cs typeface="Open Sans"/>
                 <a:sym typeface="Open Sans"/>
               </a:rPr>
-              <a:t>Señora Nancy</a:t>
-            </a:r>
-          </a:p>
-        </p:txBody>
-      </p:sp>
-      <p:sp>
-        <p:nvSpPr>
-          <p:cNvPr id="6" name="TextBox 6"/>
-          <p:cNvSpPr txBox="1"/>
-          <p:nvPr/>
-        </p:nvSpPr>
-        <p:spPr>
-          <a:xfrm>
-            <a:off x="13096648" y="405864"/>
-            <a:ext cx="1043285" cy="580390"/>
-          </a:xfrm>
-          <a:prstGeom prst="rect">
-            <a:avLst/>
-          </a:prstGeom>
-        </p:spPr>
-        <p:txBody>
-          <a:bodyPr lIns="0" tIns="0" rIns="0" bIns="0" rtlCol="0" anchor="t">
-            <a:spAutoFit/>
-          </a:bodyPr>
-          <a:lstStyle/>
-          <a:p>
-            <a:pPr algn="ctr">
+              <a:t>Intuitivo</a:t>
+            </a:r>
+          </a:p>
+          <a:p>
+            <a:pPr algn="l">
               <a:lnSpc>
                 <a:spcPts val="4759"/>
               </a:lnSpc>
@@ -9530,33 +9033,11 @@
                 <a:cs typeface="Open Sans"/>
                 <a:sym typeface="Open Sans"/>
               </a:rPr>
-              <a:t>Perfil</a:t>
-            </a:r>
-          </a:p>
-        </p:txBody>
-      </p:sp>
-      <p:sp>
-        <p:nvSpPr>
-          <p:cNvPr id="7" name="TextBox 7"/>
-          <p:cNvSpPr txBox="1"/>
-          <p:nvPr/>
-        </p:nvSpPr>
-        <p:spPr>
-          <a:xfrm>
-            <a:off x="2076307" y="5511613"/>
-            <a:ext cx="3460403" cy="580390"/>
-          </a:xfrm>
-          <a:prstGeom prst="rect">
-            <a:avLst/>
-          </a:prstGeom>
-        </p:spPr>
-        <p:txBody>
-          <a:bodyPr lIns="0" tIns="0" rIns="0" bIns="0" rtlCol="0" anchor="t">
-            <a:spAutoFit/>
-          </a:bodyPr>
-          <a:lstStyle/>
-          <a:p>
-            <a:pPr algn="ctr">
+              <a:t>Responsive</a:t>
+            </a:r>
+          </a:p>
+          <a:p>
+            <a:pPr algn="l">
               <a:lnSpc>
                 <a:spcPts val="4759"/>
               </a:lnSpc>
@@ -9571,52 +9052,11 @@
                 <a:cs typeface="Open Sans"/>
                 <a:sym typeface="Open Sans"/>
               </a:rPr>
-              <a:t>Comportamiento</a:t>
-            </a:r>
-          </a:p>
-        </p:txBody>
-      </p:sp>
-      <p:sp>
-        <p:nvSpPr>
-          <p:cNvPr id="8" name="TextBox 8"/>
-          <p:cNvSpPr txBox="1"/>
-          <p:nvPr/>
-        </p:nvSpPr>
-        <p:spPr>
-          <a:xfrm>
-            <a:off x="12173469" y="5511613"/>
-            <a:ext cx="2548235" cy="1180465"/>
-          </a:xfrm>
-          <a:prstGeom prst="rect">
-            <a:avLst/>
-          </a:prstGeom>
-        </p:spPr>
-        <p:txBody>
-          <a:bodyPr lIns="0" tIns="0" rIns="0" bIns="0" rtlCol="0" anchor="t">
-            <a:spAutoFit/>
-          </a:bodyPr>
-          <a:lstStyle/>
-          <a:p>
-            <a:pPr algn="ctr">
-              <a:lnSpc>
-                <a:spcPts val="4759"/>
-              </a:lnSpc>
-            </a:pPr>
-            <a:r>
-              <a:rPr lang="en-US" sz="3399">
-                <a:solidFill>
-                  <a:srgbClr val="000000"/>
-                </a:solidFill>
-                <a:latin typeface="Open Sans"/>
-                <a:ea typeface="Open Sans"/>
-                <a:cs typeface="Open Sans"/>
-                <a:sym typeface="Open Sans"/>
-              </a:rPr>
-              <a:t>Necesidades</a:t>
-            </a:r>
-          </a:p>
-          <a:p>
-            <a:pPr algn="ctr">
+              <a:t>Gratuito para UF</a:t>
+            </a:r>
+          </a:p>
+          <a:p>
+            <a:pPr algn="l">
               <a:lnSpc>
                 <a:spcPts val="4759"/>
               </a:lnSpc>
@@ -9635,14 +9075,14 @@
       </p:sp>
       <p:sp>
         <p:nvSpPr>
-          <p:cNvPr id="9" name="TextBox 9"/>
+          <p:cNvPr id="4" name="TextBox 4"/>
           <p:cNvSpPr txBox="1"/>
           <p:nvPr/>
         </p:nvSpPr>
         <p:spPr>
           <a:xfrm>
-            <a:off x="9307412" y="1732214"/>
-            <a:ext cx="6094512" cy="2380615"/>
+            <a:off x="5192790" y="1868476"/>
+            <a:ext cx="1583085" cy="1180465"/>
           </a:xfrm>
           <a:prstGeom prst="rect">
             <a:avLst/>
@@ -9654,7 +9094,7 @@
           </a:bodyPr>
           <a:lstStyle/>
           <a:p>
-            <a:pPr algn="l">
+            <a:pPr algn="ctr">
               <a:lnSpc>
                 <a:spcPts val="4759"/>
               </a:lnSpc>
@@ -9669,17 +9109,55 @@
                 <a:cs typeface="Open Sans"/>
                 <a:sym typeface="Open Sans"/>
               </a:rPr>
-              <a:t>60 años</a:t>
-            </a:r>
-          </a:p>
-          <a:p>
-            <a:pPr algn="l">
+              <a:t>En linea</a:t>
+            </a:r>
+          </a:p>
+          <a:p>
+            <a:pPr algn="ctr">
               <a:lnSpc>
                 <a:spcPts val="4759"/>
               </a:lnSpc>
             </a:pPr>
-            <a:r>
-              <a:rPr lang="en-US" sz="3399">
+            <a:endParaRPr lang="en-US" sz="3399">
+              <a:solidFill>
+                <a:srgbClr val="000000"/>
+              </a:solidFill>
+              <a:latin typeface="Open Sans"/>
+              <a:ea typeface="Open Sans"/>
+              <a:cs typeface="Open Sans"/>
+              <a:sym typeface="Open Sans"/>
+            </a:endParaRPr>
+          </a:p>
+        </p:txBody>
+      </p:sp>
+      <p:sp>
+        <p:nvSpPr>
+          <p:cNvPr id="5" name="TextBox 5"/>
+          <p:cNvSpPr txBox="1"/>
+          <p:nvPr/>
+        </p:nvSpPr>
+        <p:spPr>
+          <a:xfrm>
+            <a:off x="560046" y="6347222"/>
+            <a:ext cx="3519961" cy="3339381"/>
+          </a:xfrm>
+          <a:prstGeom prst="rect">
+            <a:avLst/>
+          </a:prstGeom>
+        </p:spPr>
+        <p:txBody>
+          <a:bodyPr lIns="0" tIns="0" rIns="0" bIns="0" rtlCol="0" anchor="t">
+            <a:spAutoFit/>
+          </a:bodyPr>
+          <a:lstStyle/>
+          <a:p>
+            <a:pPr algn="ctr">
+              <a:lnSpc>
+                <a:spcPts val="3797"/>
+              </a:lnSpc>
+            </a:pPr>
+            <a:r>
+              <a:rPr lang="en-US" sz="2712">
                 <a:solidFill>
                   <a:srgbClr val="000000"/>
                 </a:solidFill>
@@ -9688,17 +9166,17 @@
                 <a:cs typeface="Open Sans"/>
                 <a:sym typeface="Open Sans"/>
               </a:rPr>
-              <a:t>separada</a:t>
-            </a:r>
-          </a:p>
-          <a:p>
-            <a:pPr algn="l">
-              <a:lnSpc>
-                <a:spcPts val="4759"/>
-              </a:lnSpc>
-            </a:pPr>
-            <a:r>
-              <a:rPr lang="en-US" sz="3399">
+              <a:t>Ver novedades dentro de la villa</a:t>
+            </a:r>
+          </a:p>
+          <a:p>
+            <a:pPr algn="ctr">
+              <a:lnSpc>
+                <a:spcPts val="3797"/>
+              </a:lnSpc>
+            </a:pPr>
+            <a:r>
+              <a:rPr lang="en-US" sz="2712">
                 <a:solidFill>
                   <a:srgbClr val="000000"/>
                 </a:solidFill>
@@ -9707,17 +9185,17 @@
                 <a:cs typeface="Open Sans"/>
                 <a:sym typeface="Open Sans"/>
               </a:rPr>
-              <a:t>vive con sus nietos e hijo</a:t>
-            </a:r>
-          </a:p>
-          <a:p>
-            <a:pPr algn="l">
-              <a:lnSpc>
-                <a:spcPts val="4759"/>
-              </a:lnSpc>
-            </a:pPr>
-            <a:r>
-              <a:rPr lang="en-US" sz="3399">
+              <a:t>Mandar solicitudes</a:t>
+            </a:r>
+          </a:p>
+          <a:p>
+            <a:pPr algn="ctr">
+              <a:lnSpc>
+                <a:spcPts val="3797"/>
+              </a:lnSpc>
+            </a:pPr>
+            <a:r>
+              <a:rPr lang="en-US" sz="2712">
                 <a:solidFill>
                   <a:srgbClr val="000000"/>
                 </a:solidFill>
@@ -9726,39 +9204,17 @@
                 <a:cs typeface="Open Sans"/>
                 <a:sym typeface="Open Sans"/>
               </a:rPr>
-              <a:t>Es parte de la junta de vecinos</a:t>
-            </a:r>
-          </a:p>
-        </p:txBody>
-      </p:sp>
-      <p:sp>
-        <p:nvSpPr>
-          <p:cNvPr id="10" name="TextBox 10"/>
-          <p:cNvSpPr txBox="1"/>
-          <p:nvPr/>
-        </p:nvSpPr>
-        <p:spPr>
-          <a:xfrm>
-            <a:off x="38507" y="6834604"/>
-            <a:ext cx="2567732" cy="1780540"/>
-          </a:xfrm>
-          <a:prstGeom prst="rect">
-            <a:avLst/>
-          </a:prstGeom>
-        </p:spPr>
-        <p:txBody>
-          <a:bodyPr lIns="0" tIns="0" rIns="0" bIns="0" rtlCol="0" anchor="t">
-            <a:spAutoFit/>
-          </a:bodyPr>
-          <a:lstStyle/>
-          <a:p>
-            <a:pPr algn="just">
-              <a:lnSpc>
-                <a:spcPts val="4759"/>
-              </a:lnSpc>
-            </a:pPr>
-            <a:r>
-              <a:rPr lang="en-US" sz="3399">
+              <a:t>Sacar certificados de residencia</a:t>
+            </a:r>
+          </a:p>
+          <a:p>
+            <a:pPr algn="ctr">
+              <a:lnSpc>
+                <a:spcPts val="3797"/>
+              </a:lnSpc>
+            </a:pPr>
+            <a:r>
+              <a:rPr lang="en-US" sz="2712">
                 <a:solidFill>
                   <a:srgbClr val="000000"/>
                 </a:solidFill>
@@ -9767,17 +9223,17 @@
                 <a:cs typeface="Open Sans"/>
                 <a:sym typeface="Open Sans"/>
               </a:rPr>
-              <a:t>Agradable</a:t>
-            </a:r>
-          </a:p>
-          <a:p>
-            <a:pPr algn="just">
-              <a:lnSpc>
-                <a:spcPts val="4759"/>
-              </a:lnSpc>
-            </a:pPr>
-            <a:r>
-              <a:rPr lang="en-US" sz="3399">
+              <a:t>Inscripciones</a:t>
+            </a:r>
+          </a:p>
+          <a:p>
+            <a:pPr algn="ctr">
+              <a:lnSpc>
+                <a:spcPts val="3797"/>
+              </a:lnSpc>
+            </a:pPr>
+            <a:r>
+              <a:rPr lang="en-US" sz="2712">
                 <a:solidFill>
                   <a:srgbClr val="000000"/>
                 </a:solidFill>
@@ -9786,105 +9242,7 @@
                 <a:cs typeface="Open Sans"/>
                 <a:sym typeface="Open Sans"/>
               </a:rPr>
-              <a:t>Proactiva</a:t>
-            </a:r>
-          </a:p>
-          <a:p>
-            <a:pPr algn="just">
-              <a:lnSpc>
-                <a:spcPts val="4759"/>
-              </a:lnSpc>
-            </a:pPr>
-            <a:r>
-              <a:rPr lang="en-US" sz="3399">
-                <a:solidFill>
-                  <a:srgbClr val="000000"/>
-                </a:solidFill>
-                <a:latin typeface="Open Sans"/>
-                <a:ea typeface="Open Sans"/>
-                <a:cs typeface="Open Sans"/>
-                <a:sym typeface="Open Sans"/>
-              </a:rPr>
-              <a:t>Responsable</a:t>
-            </a:r>
-          </a:p>
-        </p:txBody>
-      </p:sp>
-      <p:sp>
-        <p:nvSpPr>
-          <p:cNvPr id="11" name="TextBox 11"/>
-          <p:cNvSpPr txBox="1"/>
-          <p:nvPr/>
-        </p:nvSpPr>
-        <p:spPr>
-          <a:xfrm>
-            <a:off x="9264026" y="7044503"/>
-            <a:ext cx="9023974" cy="2380615"/>
-          </a:xfrm>
-          <a:prstGeom prst="rect">
-            <a:avLst/>
-          </a:prstGeom>
-        </p:spPr>
-        <p:txBody>
-          <a:bodyPr lIns="0" tIns="0" rIns="0" bIns="0" rtlCol="0" anchor="t">
-            <a:spAutoFit/>
-          </a:bodyPr>
-          <a:lstStyle/>
-          <a:p>
-            <a:pPr algn="just">
-              <a:lnSpc>
-                <a:spcPts val="4759"/>
-              </a:lnSpc>
-            </a:pPr>
-            <a:r>
-              <a:rPr lang="en-US" sz="3399">
-                <a:solidFill>
-                  <a:srgbClr val="000000"/>
-                </a:solidFill>
-                <a:latin typeface="Open Sans"/>
-                <a:ea typeface="Open Sans"/>
-                <a:cs typeface="Open Sans"/>
-                <a:sym typeface="Open Sans"/>
-              </a:rPr>
-              <a:t>Le gusta proponer ideas para hacer en la junta</a:t>
-            </a:r>
-          </a:p>
-          <a:p>
-            <a:pPr algn="just">
-              <a:lnSpc>
-                <a:spcPts val="4759"/>
-              </a:lnSpc>
-            </a:pPr>
-            <a:r>
-              <a:rPr lang="en-US" sz="3399">
-                <a:solidFill>
-                  <a:srgbClr val="000000"/>
-                </a:solidFill>
-                <a:latin typeface="Open Sans"/>
-                <a:ea typeface="Open Sans"/>
-                <a:cs typeface="Open Sans"/>
-                <a:sym typeface="Open Sans"/>
-              </a:rPr>
-              <a:t>Siempre habla con la presidenta de la junta</a:t>
-            </a:r>
-          </a:p>
-          <a:p>
-            <a:pPr algn="just">
-              <a:lnSpc>
-                <a:spcPts val="4759"/>
-              </a:lnSpc>
-            </a:pPr>
-            <a:r>
-              <a:rPr lang="en-US" sz="3399">
-                <a:solidFill>
-                  <a:srgbClr val="000000"/>
-                </a:solidFill>
-                <a:latin typeface="Open Sans"/>
-                <a:ea typeface="Open Sans"/>
-                <a:cs typeface="Open Sans"/>
-                <a:sym typeface="Open Sans"/>
-              </a:rPr>
-              <a:t>Le gusta salir de panoramas con sus nietos</a:t>
+              <a:t>Reservas</a:t>
             </a:r>
           </a:p>
         </p:txBody>
@@ -9916,129 +9274,14 @@
       </p:grpSpPr>
       <p:sp>
         <p:nvSpPr>
-          <p:cNvPr id="2" name="AutoShape 2"/>
-          <p:cNvSpPr/>
-          <p:nvPr/>
-        </p:nvSpPr>
-        <p:spPr>
-          <a:xfrm flipV="1">
-            <a:off x="0" y="5143500"/>
-            <a:ext cx="18288000" cy="0"/>
-          </a:xfrm>
-          <a:prstGeom prst="line">
-            <a:avLst/>
-          </a:prstGeom>
-          <a:ln w="38100" cap="flat">
-            <a:solidFill>
-              <a:srgbClr val="000000"/>
-            </a:solidFill>
-            <a:prstDash val="solid"/>
-            <a:headEnd type="none" w="sm" len="sm"/>
-            <a:tailEnd type="none" w="sm" len="sm"/>
-          </a:ln>
-        </p:spPr>
-        <p:txBody>
-          <a:bodyPr/>
-          <a:lstStyle/>
-          <a:p>
-            <a:endParaRPr lang="es-CL"/>
-          </a:p>
-        </p:txBody>
-      </p:sp>
-      <p:sp>
-        <p:nvSpPr>
-          <p:cNvPr id="3" name="AutoShape 3"/>
-          <p:cNvSpPr/>
-          <p:nvPr/>
-        </p:nvSpPr>
-        <p:spPr>
-          <a:xfrm flipV="1">
-            <a:off x="9124950" y="0"/>
-            <a:ext cx="19050" cy="10287000"/>
-          </a:xfrm>
-          <a:prstGeom prst="line">
-            <a:avLst/>
-          </a:prstGeom>
-          <a:ln w="38100" cap="flat">
-            <a:solidFill>
-              <a:srgbClr val="000000"/>
-            </a:solidFill>
-            <a:prstDash val="solid"/>
-            <a:headEnd type="none" w="sm" len="sm"/>
-            <a:tailEnd type="none" w="sm" len="sm"/>
-          </a:ln>
-        </p:spPr>
-        <p:txBody>
-          <a:bodyPr/>
-          <a:lstStyle/>
-          <a:p>
-            <a:endParaRPr lang="es-CL"/>
-          </a:p>
-        </p:txBody>
-      </p:sp>
-      <p:sp>
-        <p:nvSpPr>
-          <p:cNvPr id="4" name="Freeform 4"/>
-          <p:cNvSpPr/>
-          <p:nvPr/>
-        </p:nvSpPr>
-        <p:spPr>
-          <a:xfrm>
-            <a:off x="1592180" y="1028700"/>
-            <a:ext cx="5601183" cy="3706116"/>
-          </a:xfrm>
-          <a:custGeom>
-            <a:avLst/>
-            <a:gdLst/>
-            <a:ahLst/>
-            <a:cxnLst/>
-            <a:rect l="l" t="t" r="r" b="b"/>
-            <a:pathLst>
-              <a:path w="5601183" h="3706116">
-                <a:moveTo>
-                  <a:pt x="0" y="0"/>
-                </a:moveTo>
-                <a:lnTo>
-                  <a:pt x="5601183" y="0"/>
-                </a:lnTo>
-                <a:lnTo>
-                  <a:pt x="5601183" y="3706116"/>
-                </a:lnTo>
-                <a:lnTo>
-                  <a:pt x="0" y="3706116"/>
-                </a:lnTo>
-                <a:lnTo>
-                  <a:pt x="0" y="0"/>
-                </a:lnTo>
-                <a:close/>
-              </a:path>
-            </a:pathLst>
-          </a:custGeom>
-          <a:blipFill>
-            <a:blip r:embed="rId2"/>
-            <a:stretch>
-              <a:fillRect/>
-            </a:stretch>
-          </a:blipFill>
-        </p:spPr>
-        <p:txBody>
-          <a:bodyPr/>
-          <a:lstStyle/>
-          <a:p>
-            <a:endParaRPr lang="es-CL"/>
-          </a:p>
-        </p:txBody>
-      </p:sp>
-      <p:sp>
-        <p:nvSpPr>
-          <p:cNvPr id="5" name="TextBox 5"/>
+          <p:cNvPr id="2" name="TextBox 2"/>
           <p:cNvSpPr txBox="1"/>
           <p:nvPr/>
         </p:nvSpPr>
         <p:spPr>
           <a:xfrm>
-            <a:off x="2826802" y="164555"/>
-            <a:ext cx="3131939" cy="580390"/>
+            <a:off x="1028700" y="1307467"/>
+            <a:ext cx="16230600" cy="12575401"/>
           </a:xfrm>
           <a:prstGeom prst="rect">
             <a:avLst/>
@@ -10050,13 +9293,13 @@
           </a:bodyPr>
           <a:lstStyle/>
           <a:p>
-            <a:pPr algn="ctr">
-              <a:lnSpc>
-                <a:spcPts val="4759"/>
-              </a:lnSpc>
-            </a:pPr>
-            <a:r>
-              <a:rPr lang="en-US" sz="3399">
+            <a:pPr algn="l">
+              <a:lnSpc>
+                <a:spcPts val="4539"/>
+              </a:lnSpc>
+            </a:pPr>
+            <a:r>
+              <a:rPr lang="en-US" sz="3242">
                 <a:solidFill>
                   <a:srgbClr val="000000"/>
                 </a:solidFill>
@@ -10065,39 +9308,17 @@
                 <a:cs typeface="Open Sans"/>
                 <a:sym typeface="Open Sans"/>
               </a:rPr>
-              <a:t>Señora Eugenia</a:t>
-            </a:r>
-          </a:p>
-        </p:txBody>
-      </p:sp>
-      <p:sp>
-        <p:nvSpPr>
-          <p:cNvPr id="6" name="TextBox 6"/>
-          <p:cNvSpPr txBox="1"/>
-          <p:nvPr/>
-        </p:nvSpPr>
-        <p:spPr>
-          <a:xfrm>
-            <a:off x="13096648" y="405864"/>
-            <a:ext cx="1043285" cy="580390"/>
-          </a:xfrm>
-          <a:prstGeom prst="rect">
-            <a:avLst/>
-          </a:prstGeom>
-        </p:spPr>
-        <p:txBody>
-          <a:bodyPr lIns="0" tIns="0" rIns="0" bIns="0" rtlCol="0" anchor="t">
-            <a:spAutoFit/>
-          </a:bodyPr>
-          <a:lstStyle/>
-          <a:p>
-            <a:pPr algn="ctr">
-              <a:lnSpc>
-                <a:spcPts val="4759"/>
-              </a:lnSpc>
-            </a:pPr>
-            <a:r>
-              <a:rPr lang="en-US" sz="3399">
+              <a:t>Objetivo: </a:t>
+            </a:r>
+          </a:p>
+          <a:p>
+            <a:pPr algn="l">
+              <a:lnSpc>
+                <a:spcPts val="4539"/>
+              </a:lnSpc>
+            </a:pPr>
+            <a:r>
+              <a:rPr lang="en-US" sz="3242">
                 <a:solidFill>
                   <a:srgbClr val="000000"/>
                 </a:solidFill>
@@ -10106,39 +9327,17 @@
                 <a:cs typeface="Open Sans"/>
                 <a:sym typeface="Open Sans"/>
               </a:rPr>
-              <a:t>Perfil</a:t>
-            </a:r>
-          </a:p>
-        </p:txBody>
-      </p:sp>
-      <p:sp>
-        <p:nvSpPr>
-          <p:cNvPr id="7" name="TextBox 7"/>
-          <p:cNvSpPr txBox="1"/>
-          <p:nvPr/>
-        </p:nvSpPr>
-        <p:spPr>
-          <a:xfrm>
-            <a:off x="2076307" y="5511613"/>
-            <a:ext cx="3460403" cy="580390"/>
-          </a:xfrm>
-          <a:prstGeom prst="rect">
-            <a:avLst/>
-          </a:prstGeom>
-        </p:spPr>
-        <p:txBody>
-          <a:bodyPr lIns="0" tIns="0" rIns="0" bIns="0" rtlCol="0" anchor="t">
-            <a:spAutoFit/>
-          </a:bodyPr>
-          <a:lstStyle/>
-          <a:p>
-            <a:pPr algn="ctr">
-              <a:lnSpc>
-                <a:spcPts val="4759"/>
-              </a:lnSpc>
-            </a:pPr>
-            <a:r>
-              <a:rPr lang="en-US" sz="3399">
+              <a:t>Que genere beneficios monetarios para la empresa.</a:t>
+            </a:r>
+          </a:p>
+          <a:p>
+            <a:pPr algn="l">
+              <a:lnSpc>
+                <a:spcPts val="4539"/>
+              </a:lnSpc>
+            </a:pPr>
+            <a:r>
+              <a:rPr lang="en-US" sz="3242">
                 <a:solidFill>
                   <a:srgbClr val="000000"/>
                 </a:solidFill>
@@ -10147,39 +9346,17 @@
                 <a:cs typeface="Open Sans"/>
                 <a:sym typeface="Open Sans"/>
               </a:rPr>
-              <a:t>Comportamiento</a:t>
-            </a:r>
-          </a:p>
-        </p:txBody>
-      </p:sp>
-      <p:sp>
-        <p:nvSpPr>
-          <p:cNvPr id="8" name="TextBox 8"/>
-          <p:cNvSpPr txBox="1"/>
-          <p:nvPr/>
-        </p:nvSpPr>
-        <p:spPr>
-          <a:xfrm>
-            <a:off x="12173469" y="5511613"/>
-            <a:ext cx="2548235" cy="1180465"/>
-          </a:xfrm>
-          <a:prstGeom prst="rect">
-            <a:avLst/>
-          </a:prstGeom>
-        </p:spPr>
-        <p:txBody>
-          <a:bodyPr lIns="0" tIns="0" rIns="0" bIns="0" rtlCol="0" anchor="t">
-            <a:spAutoFit/>
-          </a:bodyPr>
-          <a:lstStyle/>
-          <a:p>
-            <a:pPr algn="ctr">
-              <a:lnSpc>
-                <a:spcPts val="4759"/>
-              </a:lnSpc>
-            </a:pPr>
-            <a:r>
-              <a:rPr lang="en-US" sz="3399">
+              <a:t>Agilizar lo tramites de los usuarios</a:t>
+            </a:r>
+          </a:p>
+          <a:p>
+            <a:pPr algn="l">
+              <a:lnSpc>
+                <a:spcPts val="4539"/>
+              </a:lnSpc>
+            </a:pPr>
+            <a:r>
+              <a:rPr lang="en-US" sz="3242">
                 <a:solidFill>
                   <a:srgbClr val="000000"/>
                 </a:solidFill>
@@ -10188,16 +9365,16 @@
                 <a:cs typeface="Open Sans"/>
                 <a:sym typeface="Open Sans"/>
               </a:rPr>
-              <a:t>Necesidades</a:t>
-            </a:r>
-          </a:p>
-          <a:p>
-            <a:pPr algn="ctr">
-              <a:lnSpc>
-                <a:spcPts val="4759"/>
-              </a:lnSpc>
-            </a:pPr>
-            <a:endParaRPr lang="en-US" sz="3399">
+              <a:t> </a:t>
+            </a:r>
+          </a:p>
+          <a:p>
+            <a:pPr algn="l">
+              <a:lnSpc>
+                <a:spcPts val="4539"/>
+              </a:lnSpc>
+            </a:pPr>
+            <a:endParaRPr lang="en-US" sz="3242">
               <a:solidFill>
                 <a:srgbClr val="000000"/>
               </a:solidFill>
@@ -10207,36 +9384,14 @@
               <a:sym typeface="Open Sans"/>
             </a:endParaRPr>
           </a:p>
-        </p:txBody>
-      </p:sp>
-      <p:sp>
-        <p:nvSpPr>
-          <p:cNvPr id="9" name="TextBox 9"/>
-          <p:cNvSpPr txBox="1"/>
-          <p:nvPr/>
-        </p:nvSpPr>
-        <p:spPr>
-          <a:xfrm>
-            <a:off x="9630515" y="1409110"/>
-            <a:ext cx="6094512" cy="2380615"/>
-          </a:xfrm>
-          <a:prstGeom prst="rect">
-            <a:avLst/>
-          </a:prstGeom>
-        </p:spPr>
-        <p:txBody>
-          <a:bodyPr lIns="0" tIns="0" rIns="0" bIns="0" rtlCol="0" anchor="t">
-            <a:spAutoFit/>
-          </a:bodyPr>
-          <a:lstStyle/>
           <a:p>
             <a:pPr algn="l">
               <a:lnSpc>
-                <a:spcPts val="4759"/>
-              </a:lnSpc>
-            </a:pPr>
-            <a:r>
-              <a:rPr lang="en-US" sz="3399">
+                <a:spcPts val="4539"/>
+              </a:lnSpc>
+            </a:pPr>
+            <a:r>
+              <a:rPr lang="en-US" sz="3242">
                 <a:solidFill>
                   <a:srgbClr val="000000"/>
                 </a:solidFill>
@@ -10245,17 +9400,17 @@
                 <a:cs typeface="Open Sans"/>
                 <a:sym typeface="Open Sans"/>
               </a:rPr>
-              <a:t>63 años</a:t>
+              <a:t>Grupo de negocio:</a:t>
             </a:r>
           </a:p>
           <a:p>
             <a:pPr algn="l">
               <a:lnSpc>
-                <a:spcPts val="4759"/>
-              </a:lnSpc>
-            </a:pPr>
-            <a:r>
-              <a:rPr lang="en-US" sz="3399">
+                <a:spcPts val="4539"/>
+              </a:lnSpc>
+            </a:pPr>
+            <a:r>
+              <a:rPr lang="en-US" sz="3242">
                 <a:solidFill>
                   <a:srgbClr val="000000"/>
                 </a:solidFill>
@@ -10264,17 +9419,17 @@
                 <a:cs typeface="Open Sans"/>
                 <a:sym typeface="Open Sans"/>
               </a:rPr>
-              <a:t>Viuda</a:t>
+              <a:t>Conseguir el maximo beneficio posible en el menor tiempo posible</a:t>
             </a:r>
           </a:p>
           <a:p>
             <a:pPr algn="l">
               <a:lnSpc>
-                <a:spcPts val="4759"/>
-              </a:lnSpc>
-            </a:pPr>
-            <a:r>
-              <a:rPr lang="en-US" sz="3399">
+                <a:spcPts val="4539"/>
+              </a:lnSpc>
+            </a:pPr>
+            <a:r>
+              <a:rPr lang="en-US" sz="3242">
                 <a:solidFill>
                   <a:srgbClr val="000000"/>
                 </a:solidFill>
@@ -10283,17 +9438,17 @@
                 <a:cs typeface="Open Sans"/>
                 <a:sym typeface="Open Sans"/>
               </a:rPr>
-              <a:t>Vive sola con sus gatos</a:t>
+              <a:t>Que genere ganancias a través de los certificados y/o con ads dentro de la web</a:t>
             </a:r>
           </a:p>
           <a:p>
             <a:pPr algn="l">
               <a:lnSpc>
-                <a:spcPts val="4759"/>
-              </a:lnSpc>
-            </a:pPr>
-            <a:r>
-              <a:rPr lang="en-US" sz="3399">
+                <a:spcPts val="4539"/>
+              </a:lnSpc>
+            </a:pPr>
+            <a:r>
+              <a:rPr lang="en-US" sz="3242">
                 <a:solidFill>
                   <a:srgbClr val="000000"/>
                 </a:solidFill>
@@ -10302,39 +9457,33 @@
                 <a:cs typeface="Open Sans"/>
                 <a:sym typeface="Open Sans"/>
               </a:rPr>
-              <a:t>Es parte de la junta de vecinos</a:t>
-            </a:r>
-          </a:p>
-        </p:txBody>
-      </p:sp>
-      <p:sp>
-        <p:nvSpPr>
-          <p:cNvPr id="10" name="TextBox 10"/>
-          <p:cNvSpPr txBox="1"/>
-          <p:nvPr/>
-        </p:nvSpPr>
-        <p:spPr>
-          <a:xfrm>
-            <a:off x="38507" y="6834604"/>
-            <a:ext cx="2623542" cy="2380615"/>
-          </a:xfrm>
-          <a:prstGeom prst="rect">
-            <a:avLst/>
-          </a:prstGeom>
-        </p:spPr>
-        <p:txBody>
-          <a:bodyPr lIns="0" tIns="0" rIns="0" bIns="0" rtlCol="0" anchor="t">
-            <a:spAutoFit/>
-          </a:bodyPr>
-          <a:lstStyle/>
-          <a:p>
-            <a:pPr algn="just">
-              <a:lnSpc>
-                <a:spcPts val="4759"/>
-              </a:lnSpc>
-            </a:pPr>
-            <a:r>
-              <a:rPr lang="en-US" sz="3399">
+              <a:t>Que llegue a varias comunas </a:t>
+            </a:r>
+          </a:p>
+          <a:p>
+            <a:pPr algn="l">
+              <a:lnSpc>
+                <a:spcPts val="4539"/>
+              </a:lnSpc>
+            </a:pPr>
+            <a:endParaRPr lang="en-US" sz="3242">
+              <a:solidFill>
+                <a:srgbClr val="000000"/>
+              </a:solidFill>
+              <a:latin typeface="Open Sans"/>
+              <a:ea typeface="Open Sans"/>
+              <a:cs typeface="Open Sans"/>
+              <a:sym typeface="Open Sans"/>
+            </a:endParaRPr>
+          </a:p>
+          <a:p>
+            <a:pPr algn="l">
+              <a:lnSpc>
+                <a:spcPts val="4539"/>
+              </a:lnSpc>
+            </a:pPr>
+            <a:r>
+              <a:rPr lang="en-US" sz="3242">
                 <a:solidFill>
                   <a:srgbClr val="000000"/>
                 </a:solidFill>
@@ -10343,17 +9492,17 @@
                 <a:cs typeface="Open Sans"/>
                 <a:sym typeface="Open Sans"/>
               </a:rPr>
-              <a:t>Conflictiva</a:t>
-            </a:r>
-          </a:p>
-          <a:p>
-            <a:pPr algn="just">
-              <a:lnSpc>
-                <a:spcPts val="4759"/>
-              </a:lnSpc>
-            </a:pPr>
-            <a:r>
-              <a:rPr lang="en-US" sz="3399">
+              <a:t>Grupo de cumplir las necesidades para los usuarios finales</a:t>
+            </a:r>
+          </a:p>
+          <a:p>
+            <a:pPr algn="l">
+              <a:lnSpc>
+                <a:spcPts val="4539"/>
+              </a:lnSpc>
+            </a:pPr>
+            <a:r>
+              <a:rPr lang="en-US" sz="3242">
                 <a:solidFill>
                   <a:srgbClr val="000000"/>
                 </a:solidFill>
@@ -10362,17 +9511,17 @@
                 <a:cs typeface="Open Sans"/>
                 <a:sym typeface="Open Sans"/>
               </a:rPr>
-              <a:t>Puntual</a:t>
-            </a:r>
-          </a:p>
-          <a:p>
-            <a:pPr algn="just">
-              <a:lnSpc>
-                <a:spcPts val="4759"/>
-              </a:lnSpc>
-            </a:pPr>
-            <a:r>
-              <a:rPr lang="en-US" sz="3399">
+              <a:t>Cubrir las necesidades de los clientes.</a:t>
+            </a:r>
+          </a:p>
+          <a:p>
+            <a:pPr algn="l">
+              <a:lnSpc>
+                <a:spcPts val="4539"/>
+              </a:lnSpc>
+            </a:pPr>
+            <a:r>
+              <a:rPr lang="en-US" sz="3242">
                 <a:solidFill>
                   <a:srgbClr val="000000"/>
                 </a:solidFill>
@@ -10381,17 +9530,145 @@
                 <a:cs typeface="Open Sans"/>
                 <a:sym typeface="Open Sans"/>
               </a:rPr>
-              <a:t>Responsable</a:t>
-            </a:r>
-          </a:p>
-          <a:p>
-            <a:pPr algn="just">
-              <a:lnSpc>
-                <a:spcPts val="4759"/>
-              </a:lnSpc>
-            </a:pPr>
-            <a:r>
-              <a:rPr lang="en-US" sz="3399">
+              <a:t>Facilitar la comunicación de los usuarios.</a:t>
+            </a:r>
+          </a:p>
+          <a:p>
+            <a:pPr algn="l">
+              <a:lnSpc>
+                <a:spcPts val="4539"/>
+              </a:lnSpc>
+            </a:pPr>
+            <a:endParaRPr lang="en-US" sz="3242">
+              <a:solidFill>
+                <a:srgbClr val="000000"/>
+              </a:solidFill>
+              <a:latin typeface="Open Sans"/>
+              <a:ea typeface="Open Sans"/>
+              <a:cs typeface="Open Sans"/>
+              <a:sym typeface="Open Sans"/>
+            </a:endParaRPr>
+          </a:p>
+          <a:p>
+            <a:pPr algn="l">
+              <a:lnSpc>
+                <a:spcPts val="4539"/>
+              </a:lnSpc>
+            </a:pPr>
+            <a:endParaRPr lang="en-US" sz="3242">
+              <a:solidFill>
+                <a:srgbClr val="000000"/>
+              </a:solidFill>
+              <a:latin typeface="Open Sans"/>
+              <a:ea typeface="Open Sans"/>
+              <a:cs typeface="Open Sans"/>
+              <a:sym typeface="Open Sans"/>
+            </a:endParaRPr>
+          </a:p>
+          <a:p>
+            <a:pPr algn="l">
+              <a:lnSpc>
+                <a:spcPts val="4539"/>
+              </a:lnSpc>
+            </a:pPr>
+            <a:endParaRPr lang="en-US" sz="3242">
+              <a:solidFill>
+                <a:srgbClr val="000000"/>
+              </a:solidFill>
+              <a:latin typeface="Open Sans"/>
+              <a:ea typeface="Open Sans"/>
+              <a:cs typeface="Open Sans"/>
+              <a:sym typeface="Open Sans"/>
+            </a:endParaRPr>
+          </a:p>
+          <a:p>
+            <a:pPr algn="l">
+              <a:lnSpc>
+                <a:spcPts val="4539"/>
+              </a:lnSpc>
+            </a:pPr>
+            <a:endParaRPr lang="en-US" sz="3242">
+              <a:solidFill>
+                <a:srgbClr val="000000"/>
+              </a:solidFill>
+              <a:latin typeface="Open Sans"/>
+              <a:ea typeface="Open Sans"/>
+              <a:cs typeface="Open Sans"/>
+              <a:sym typeface="Open Sans"/>
+            </a:endParaRPr>
+          </a:p>
+          <a:p>
+            <a:pPr algn="l">
+              <a:lnSpc>
+                <a:spcPts val="4539"/>
+              </a:lnSpc>
+            </a:pPr>
+            <a:endParaRPr lang="en-US" sz="3242">
+              <a:solidFill>
+                <a:srgbClr val="000000"/>
+              </a:solidFill>
+              <a:latin typeface="Open Sans"/>
+              <a:ea typeface="Open Sans"/>
+              <a:cs typeface="Open Sans"/>
+              <a:sym typeface="Open Sans"/>
+            </a:endParaRPr>
+          </a:p>
+          <a:p>
+            <a:pPr algn="l">
+              <a:lnSpc>
+                <a:spcPts val="4539"/>
+              </a:lnSpc>
+            </a:pPr>
+            <a:endParaRPr lang="en-US" sz="3242">
+              <a:solidFill>
+                <a:srgbClr val="000000"/>
+              </a:solidFill>
+              <a:latin typeface="Open Sans"/>
+              <a:ea typeface="Open Sans"/>
+              <a:cs typeface="Open Sans"/>
+              <a:sym typeface="Open Sans"/>
+            </a:endParaRPr>
+          </a:p>
+          <a:p>
+            <a:pPr algn="l">
+              <a:lnSpc>
+                <a:spcPts val="4539"/>
+              </a:lnSpc>
+            </a:pPr>
+            <a:endParaRPr lang="en-US" sz="3242">
+              <a:solidFill>
+                <a:srgbClr val="000000"/>
+              </a:solidFill>
+              <a:latin typeface="Open Sans"/>
+              <a:ea typeface="Open Sans"/>
+              <a:cs typeface="Open Sans"/>
+              <a:sym typeface="Open Sans"/>
+            </a:endParaRPr>
+          </a:p>
+          <a:p>
+            <a:pPr algn="l">
+              <a:lnSpc>
+                <a:spcPts val="4539"/>
+              </a:lnSpc>
+            </a:pPr>
+            <a:endParaRPr lang="en-US" sz="3242">
+              <a:solidFill>
+                <a:srgbClr val="000000"/>
+              </a:solidFill>
+              <a:latin typeface="Open Sans"/>
+              <a:ea typeface="Open Sans"/>
+              <a:cs typeface="Open Sans"/>
+              <a:sym typeface="Open Sans"/>
+            </a:endParaRPr>
+          </a:p>
+          <a:p>
+            <a:pPr algn="l">
+              <a:lnSpc>
+                <a:spcPts val="4539"/>
+              </a:lnSpc>
+            </a:pPr>
+            <a:r>
+              <a:rPr lang="en-US" sz="3242">
                 <a:solidFill>
                   <a:srgbClr val="000000"/>
                 </a:solidFill>
@@ -10400,86 +9677,7 @@
                 <a:cs typeface="Open Sans"/>
                 <a:sym typeface="Open Sans"/>
               </a:rPr>
-              <a:t>Observadora</a:t>
-            </a:r>
-          </a:p>
-        </p:txBody>
-      </p:sp>
-      <p:sp>
-        <p:nvSpPr>
-          <p:cNvPr id="11" name="TextBox 11"/>
-          <p:cNvSpPr txBox="1"/>
-          <p:nvPr/>
-        </p:nvSpPr>
-        <p:spPr>
-          <a:xfrm>
-            <a:off x="9264026" y="7044503"/>
-            <a:ext cx="9023974" cy="2980690"/>
-          </a:xfrm>
-          <a:prstGeom prst="rect">
-            <a:avLst/>
-          </a:prstGeom>
-        </p:spPr>
-        <p:txBody>
-          <a:bodyPr lIns="0" tIns="0" rIns="0" bIns="0" rtlCol="0" anchor="t">
-            <a:spAutoFit/>
-          </a:bodyPr>
-          <a:lstStyle/>
-          <a:p>
-            <a:pPr algn="just">
-              <a:lnSpc>
-                <a:spcPts val="4759"/>
-              </a:lnSpc>
-            </a:pPr>
-            <a:r>
-              <a:rPr lang="en-US" sz="3399">
-                <a:solidFill>
-                  <a:srgbClr val="000000"/>
-                </a:solidFill>
-                <a:latin typeface="Open Sans"/>
-                <a:ea typeface="Open Sans"/>
-                <a:cs typeface="Open Sans"/>
-                <a:sym typeface="Open Sans"/>
-              </a:rPr>
-              <a:t>No le gustan las ideas de los demas y quiere imponer su punto de vista</a:t>
-            </a:r>
-          </a:p>
-          <a:p>
-            <a:pPr algn="just">
-              <a:lnSpc>
-                <a:spcPts val="4759"/>
-              </a:lnSpc>
-            </a:pPr>
-            <a:r>
-              <a:rPr lang="en-US" sz="3399">
-                <a:solidFill>
-                  <a:srgbClr val="000000"/>
-                </a:solidFill>
-                <a:latin typeface="Open Sans"/>
-                <a:ea typeface="Open Sans"/>
-                <a:cs typeface="Open Sans"/>
-                <a:sym typeface="Open Sans"/>
-              </a:rPr>
-              <a:t>Siempre habla se queja en la junta de vecinos</a:t>
-            </a:r>
-          </a:p>
-          <a:p>
-            <a:pPr algn="just">
-              <a:lnSpc>
-                <a:spcPts val="4759"/>
-              </a:lnSpc>
-            </a:pPr>
-            <a:r>
-              <a:rPr lang="en-US" sz="3399">
-                <a:solidFill>
-                  <a:srgbClr val="000000"/>
-                </a:solidFill>
-                <a:latin typeface="Open Sans"/>
-                <a:ea typeface="Open Sans"/>
-                <a:cs typeface="Open Sans"/>
-                <a:sym typeface="Open Sans"/>
-              </a:rPr>
-              <a:t>Le gusta observar a las personas.</a:t>
+              <a:t> </a:t>
             </a:r>
           </a:p>
         </p:txBody>
@@ -10579,8 +9777,8 @@
         </p:nvSpPr>
         <p:spPr>
           <a:xfrm>
-            <a:off x="1350278" y="1056385"/>
-            <a:ext cx="5634936" cy="3756624"/>
+            <a:off x="1028700" y="1210803"/>
+            <a:ext cx="6726942" cy="3901627"/>
           </a:xfrm>
           <a:custGeom>
             <a:avLst/>
@@ -10589,18 +9787,18 @@
             <a:cxnLst/>
             <a:rect l="l" t="t" r="r" b="b"/>
             <a:pathLst>
-              <a:path w="5634936" h="3756624">
+              <a:path w="6726942" h="3901627">
                 <a:moveTo>
                   <a:pt x="0" y="0"/>
                 </a:moveTo>
                 <a:lnTo>
-                  <a:pt x="5634936" y="0"/>
-                </a:lnTo>
-                <a:lnTo>
-                  <a:pt x="5634936" y="3756624"/>
-                </a:lnTo>
-                <a:lnTo>
-                  <a:pt x="0" y="3756624"/>
+                  <a:pt x="6726942" y="0"/>
+                </a:lnTo>
+                <a:lnTo>
+                  <a:pt x="6726942" y="3901627"/>
+                </a:lnTo>
+                <a:lnTo>
+                  <a:pt x="0" y="3901627"/>
                 </a:lnTo>
                 <a:lnTo>
                   <a:pt x="0" y="0"/>
@@ -10632,8 +9830,8 @@
         </p:nvSpPr>
         <p:spPr>
           <a:xfrm>
-            <a:off x="2720613" y="164555"/>
-            <a:ext cx="3344317" cy="580390"/>
+            <a:off x="2999070" y="164555"/>
+            <a:ext cx="2787402" cy="580390"/>
           </a:xfrm>
           <a:prstGeom prst="rect">
             <a:avLst/>
@@ -10660,7 +9858,7 @@
                 <a:cs typeface="Open Sans"/>
                 <a:sym typeface="Open Sans"/>
               </a:rPr>
-              <a:t>Jesus de Nazaret</a:t>
+              <a:t>Señora Nancy</a:t>
             </a:r>
           </a:p>
         </p:txBody>
@@ -10812,8 +10010,8 @@
         </p:nvSpPr>
         <p:spPr>
           <a:xfrm>
-            <a:off x="9630515" y="1409110"/>
-            <a:ext cx="7311926" cy="2380615"/>
+            <a:off x="9307412" y="1732214"/>
+            <a:ext cx="6094512" cy="2380615"/>
           </a:xfrm>
           <a:prstGeom prst="rect">
             <a:avLst/>
@@ -10840,7 +10038,7 @@
                 <a:cs typeface="Open Sans"/>
                 <a:sym typeface="Open Sans"/>
               </a:rPr>
-              <a:t>38 años</a:t>
+              <a:t>60 años</a:t>
             </a:r>
           </a:p>
           <a:p>
@@ -10859,7 +10057,7 @@
                 <a:cs typeface="Open Sans"/>
                 <a:sym typeface="Open Sans"/>
               </a:rPr>
-              <a:t>Casado</a:t>
+              <a:t>separada</a:t>
             </a:r>
           </a:p>
           <a:p>
@@ -10878,11 +10076,492 @@
                 <a:cs typeface="Open Sans"/>
                 <a:sym typeface="Open Sans"/>
               </a:rPr>
-              <a:t>Vive con su familia y tienen un perro</a:t>
+              <a:t>vive con sus nietos e hijo</a:t>
             </a:r>
           </a:p>
           <a:p>
             <a:pPr algn="l">
+              <a:lnSpc>
+                <a:spcPts val="4759"/>
+              </a:lnSpc>
+            </a:pPr>
+            <a:r>
+              <a:rPr lang="en-US" sz="3399">
+                <a:solidFill>
+                  <a:srgbClr val="000000"/>
+                </a:solidFill>
+                <a:latin typeface="Open Sans"/>
+                <a:ea typeface="Open Sans"/>
+                <a:cs typeface="Open Sans"/>
+                <a:sym typeface="Open Sans"/>
+              </a:rPr>
+              <a:t>Es parte de la junta de vecinos</a:t>
+            </a:r>
+          </a:p>
+        </p:txBody>
+      </p:sp>
+      <p:sp>
+        <p:nvSpPr>
+          <p:cNvPr id="10" name="TextBox 10"/>
+          <p:cNvSpPr txBox="1"/>
+          <p:nvPr/>
+        </p:nvSpPr>
+        <p:spPr>
+          <a:xfrm>
+            <a:off x="38507" y="6834604"/>
+            <a:ext cx="2567732" cy="1780540"/>
+          </a:xfrm>
+          <a:prstGeom prst="rect">
+            <a:avLst/>
+          </a:prstGeom>
+        </p:spPr>
+        <p:txBody>
+          <a:bodyPr lIns="0" tIns="0" rIns="0" bIns="0" rtlCol="0" anchor="t">
+            <a:spAutoFit/>
+          </a:bodyPr>
+          <a:lstStyle/>
+          <a:p>
+            <a:pPr algn="just">
+              <a:lnSpc>
+                <a:spcPts val="4759"/>
+              </a:lnSpc>
+            </a:pPr>
+            <a:r>
+              <a:rPr lang="en-US" sz="3399">
+                <a:solidFill>
+                  <a:srgbClr val="000000"/>
+                </a:solidFill>
+                <a:latin typeface="Open Sans"/>
+                <a:ea typeface="Open Sans"/>
+                <a:cs typeface="Open Sans"/>
+                <a:sym typeface="Open Sans"/>
+              </a:rPr>
+              <a:t>Agradable</a:t>
+            </a:r>
+          </a:p>
+          <a:p>
+            <a:pPr algn="just">
+              <a:lnSpc>
+                <a:spcPts val="4759"/>
+              </a:lnSpc>
+            </a:pPr>
+            <a:r>
+              <a:rPr lang="en-US" sz="3399">
+                <a:solidFill>
+                  <a:srgbClr val="000000"/>
+                </a:solidFill>
+                <a:latin typeface="Open Sans"/>
+                <a:ea typeface="Open Sans"/>
+                <a:cs typeface="Open Sans"/>
+                <a:sym typeface="Open Sans"/>
+              </a:rPr>
+              <a:t>Proactiva</a:t>
+            </a:r>
+          </a:p>
+          <a:p>
+            <a:pPr algn="just">
+              <a:lnSpc>
+                <a:spcPts val="4759"/>
+              </a:lnSpc>
+            </a:pPr>
+            <a:r>
+              <a:rPr lang="en-US" sz="3399">
+                <a:solidFill>
+                  <a:srgbClr val="000000"/>
+                </a:solidFill>
+                <a:latin typeface="Open Sans"/>
+                <a:ea typeface="Open Sans"/>
+                <a:cs typeface="Open Sans"/>
+                <a:sym typeface="Open Sans"/>
+              </a:rPr>
+              <a:t>Responsable</a:t>
+            </a:r>
+          </a:p>
+        </p:txBody>
+      </p:sp>
+      <p:sp>
+        <p:nvSpPr>
+          <p:cNvPr id="11" name="TextBox 11"/>
+          <p:cNvSpPr txBox="1"/>
+          <p:nvPr/>
+        </p:nvSpPr>
+        <p:spPr>
+          <a:xfrm>
+            <a:off x="9264026" y="7044503"/>
+            <a:ext cx="9023974" cy="2380615"/>
+          </a:xfrm>
+          <a:prstGeom prst="rect">
+            <a:avLst/>
+          </a:prstGeom>
+        </p:spPr>
+        <p:txBody>
+          <a:bodyPr lIns="0" tIns="0" rIns="0" bIns="0" rtlCol="0" anchor="t">
+            <a:spAutoFit/>
+          </a:bodyPr>
+          <a:lstStyle/>
+          <a:p>
+            <a:pPr algn="just">
+              <a:lnSpc>
+                <a:spcPts val="4759"/>
+              </a:lnSpc>
+            </a:pPr>
+            <a:r>
+              <a:rPr lang="en-US" sz="3399">
+                <a:solidFill>
+                  <a:srgbClr val="000000"/>
+                </a:solidFill>
+                <a:latin typeface="Open Sans"/>
+                <a:ea typeface="Open Sans"/>
+                <a:cs typeface="Open Sans"/>
+                <a:sym typeface="Open Sans"/>
+              </a:rPr>
+              <a:t>Le gusta proponer ideas para hacer en la junta</a:t>
+            </a:r>
+          </a:p>
+          <a:p>
+            <a:pPr algn="just">
+              <a:lnSpc>
+                <a:spcPts val="4759"/>
+              </a:lnSpc>
+            </a:pPr>
+            <a:r>
+              <a:rPr lang="en-US" sz="3399">
+                <a:solidFill>
+                  <a:srgbClr val="000000"/>
+                </a:solidFill>
+                <a:latin typeface="Open Sans"/>
+                <a:ea typeface="Open Sans"/>
+                <a:cs typeface="Open Sans"/>
+                <a:sym typeface="Open Sans"/>
+              </a:rPr>
+              <a:t>Siempre habla con la presidenta de la junta</a:t>
+            </a:r>
+          </a:p>
+          <a:p>
+            <a:pPr algn="just">
+              <a:lnSpc>
+                <a:spcPts val="4759"/>
+              </a:lnSpc>
+            </a:pPr>
+            <a:r>
+              <a:rPr lang="en-US" sz="3399">
+                <a:solidFill>
+                  <a:srgbClr val="000000"/>
+                </a:solidFill>
+                <a:latin typeface="Open Sans"/>
+                <a:ea typeface="Open Sans"/>
+                <a:cs typeface="Open Sans"/>
+                <a:sym typeface="Open Sans"/>
+              </a:rPr>
+              <a:t>Le gusta salir de panoramas con sus nietos</a:t>
+            </a:r>
+          </a:p>
+        </p:txBody>
+      </p:sp>
+    </p:spTree>
+  </p:cSld>
+  <p:clrMapOvr>
+    <a:masterClrMapping/>
+  </p:clrMapOvr>
+</p:sld>
+</file>
+
+<file path=ppt/slides/slide7.xml><?xml version="1.0" encoding="utf-8"?>
+<p:sld xmlns:a="http://schemas.openxmlformats.org/drawingml/2006/main" xmlns:r="http://schemas.openxmlformats.org/officeDocument/2006/relationships" xmlns:p="http://schemas.openxmlformats.org/presentationml/2006/main">
+  <p:cSld>
+    <p:spTree>
+      <p:nvGrpSpPr>
+        <p:cNvPr id="1" name=""/>
+        <p:cNvGrpSpPr/>
+        <p:nvPr/>
+      </p:nvGrpSpPr>
+      <p:grpSpPr>
+        <a:xfrm>
+          <a:off x="0" y="0"/>
+          <a:ext cx="0" cy="0"/>
+          <a:chOff x="0" y="0"/>
+          <a:chExt cx="0" cy="0"/>
+        </a:xfrm>
+      </p:grpSpPr>
+      <p:sp>
+        <p:nvSpPr>
+          <p:cNvPr id="2" name="AutoShape 2"/>
+          <p:cNvSpPr/>
+          <p:nvPr/>
+        </p:nvSpPr>
+        <p:spPr>
+          <a:xfrm flipV="1">
+            <a:off x="0" y="5143500"/>
+            <a:ext cx="18288000" cy="0"/>
+          </a:xfrm>
+          <a:prstGeom prst="line">
+            <a:avLst/>
+          </a:prstGeom>
+          <a:ln w="38100" cap="flat">
+            <a:solidFill>
+              <a:srgbClr val="000000"/>
+            </a:solidFill>
+            <a:prstDash val="solid"/>
+            <a:headEnd type="none" w="sm" len="sm"/>
+            <a:tailEnd type="none" w="sm" len="sm"/>
+          </a:ln>
+        </p:spPr>
+        <p:txBody>
+          <a:bodyPr/>
+          <a:lstStyle/>
+          <a:p>
+            <a:endParaRPr lang="es-CL"/>
+          </a:p>
+        </p:txBody>
+      </p:sp>
+      <p:sp>
+        <p:nvSpPr>
+          <p:cNvPr id="3" name="AutoShape 3"/>
+          <p:cNvSpPr/>
+          <p:nvPr/>
+        </p:nvSpPr>
+        <p:spPr>
+          <a:xfrm flipV="1">
+            <a:off x="9124950" y="0"/>
+            <a:ext cx="19050" cy="10287000"/>
+          </a:xfrm>
+          <a:prstGeom prst="line">
+            <a:avLst/>
+          </a:prstGeom>
+          <a:ln w="38100" cap="flat">
+            <a:solidFill>
+              <a:srgbClr val="000000"/>
+            </a:solidFill>
+            <a:prstDash val="solid"/>
+            <a:headEnd type="none" w="sm" len="sm"/>
+            <a:tailEnd type="none" w="sm" len="sm"/>
+          </a:ln>
+        </p:spPr>
+        <p:txBody>
+          <a:bodyPr/>
+          <a:lstStyle/>
+          <a:p>
+            <a:endParaRPr lang="es-CL"/>
+          </a:p>
+        </p:txBody>
+      </p:sp>
+      <p:sp>
+        <p:nvSpPr>
+          <p:cNvPr id="4" name="Freeform 4"/>
+          <p:cNvSpPr/>
+          <p:nvPr/>
+        </p:nvSpPr>
+        <p:spPr>
+          <a:xfrm>
+            <a:off x="1592180" y="1028700"/>
+            <a:ext cx="5601183" cy="3706116"/>
+          </a:xfrm>
+          <a:custGeom>
+            <a:avLst/>
+            <a:gdLst/>
+            <a:ahLst/>
+            <a:cxnLst/>
+            <a:rect l="l" t="t" r="r" b="b"/>
+            <a:pathLst>
+              <a:path w="5601183" h="3706116">
+                <a:moveTo>
+                  <a:pt x="0" y="0"/>
+                </a:moveTo>
+                <a:lnTo>
+                  <a:pt x="5601183" y="0"/>
+                </a:lnTo>
+                <a:lnTo>
+                  <a:pt x="5601183" y="3706116"/>
+                </a:lnTo>
+                <a:lnTo>
+                  <a:pt x="0" y="3706116"/>
+                </a:lnTo>
+                <a:lnTo>
+                  <a:pt x="0" y="0"/>
+                </a:lnTo>
+                <a:close/>
+              </a:path>
+            </a:pathLst>
+          </a:custGeom>
+          <a:blipFill>
+            <a:blip r:embed="rId2"/>
+            <a:stretch>
+              <a:fillRect/>
+            </a:stretch>
+          </a:blipFill>
+        </p:spPr>
+        <p:txBody>
+          <a:bodyPr/>
+          <a:lstStyle/>
+          <a:p>
+            <a:endParaRPr lang="es-CL"/>
+          </a:p>
+        </p:txBody>
+      </p:sp>
+      <p:sp>
+        <p:nvSpPr>
+          <p:cNvPr id="5" name="TextBox 5"/>
+          <p:cNvSpPr txBox="1"/>
+          <p:nvPr/>
+        </p:nvSpPr>
+        <p:spPr>
+          <a:xfrm>
+            <a:off x="2826802" y="164555"/>
+            <a:ext cx="3131939" cy="580390"/>
+          </a:xfrm>
+          <a:prstGeom prst="rect">
+            <a:avLst/>
+          </a:prstGeom>
+        </p:spPr>
+        <p:txBody>
+          <a:bodyPr lIns="0" tIns="0" rIns="0" bIns="0" rtlCol="0" anchor="t">
+            <a:spAutoFit/>
+          </a:bodyPr>
+          <a:lstStyle/>
+          <a:p>
+            <a:pPr algn="ctr">
+              <a:lnSpc>
+                <a:spcPts val="4759"/>
+              </a:lnSpc>
+            </a:pPr>
+            <a:r>
+              <a:rPr lang="en-US" sz="3399">
+                <a:solidFill>
+                  <a:srgbClr val="000000"/>
+                </a:solidFill>
+                <a:latin typeface="Open Sans"/>
+                <a:ea typeface="Open Sans"/>
+                <a:cs typeface="Open Sans"/>
+                <a:sym typeface="Open Sans"/>
+              </a:rPr>
+              <a:t>Señora Eugenia</a:t>
+            </a:r>
+          </a:p>
+        </p:txBody>
+      </p:sp>
+      <p:sp>
+        <p:nvSpPr>
+          <p:cNvPr id="6" name="TextBox 6"/>
+          <p:cNvSpPr txBox="1"/>
+          <p:nvPr/>
+        </p:nvSpPr>
+        <p:spPr>
+          <a:xfrm>
+            <a:off x="13096648" y="405864"/>
+            <a:ext cx="1043285" cy="580390"/>
+          </a:xfrm>
+          <a:prstGeom prst="rect">
+            <a:avLst/>
+          </a:prstGeom>
+        </p:spPr>
+        <p:txBody>
+          <a:bodyPr lIns="0" tIns="0" rIns="0" bIns="0" rtlCol="0" anchor="t">
+            <a:spAutoFit/>
+          </a:bodyPr>
+          <a:lstStyle/>
+          <a:p>
+            <a:pPr algn="ctr">
+              <a:lnSpc>
+                <a:spcPts val="4759"/>
+              </a:lnSpc>
+            </a:pPr>
+            <a:r>
+              <a:rPr lang="en-US" sz="3399">
+                <a:solidFill>
+                  <a:srgbClr val="000000"/>
+                </a:solidFill>
+                <a:latin typeface="Open Sans"/>
+                <a:ea typeface="Open Sans"/>
+                <a:cs typeface="Open Sans"/>
+                <a:sym typeface="Open Sans"/>
+              </a:rPr>
+              <a:t>Perfil</a:t>
+            </a:r>
+          </a:p>
+        </p:txBody>
+      </p:sp>
+      <p:sp>
+        <p:nvSpPr>
+          <p:cNvPr id="7" name="TextBox 7"/>
+          <p:cNvSpPr txBox="1"/>
+          <p:nvPr/>
+        </p:nvSpPr>
+        <p:spPr>
+          <a:xfrm>
+            <a:off x="2076307" y="5511613"/>
+            <a:ext cx="3460403" cy="580390"/>
+          </a:xfrm>
+          <a:prstGeom prst="rect">
+            <a:avLst/>
+          </a:prstGeom>
+        </p:spPr>
+        <p:txBody>
+          <a:bodyPr lIns="0" tIns="0" rIns="0" bIns="0" rtlCol="0" anchor="t">
+            <a:spAutoFit/>
+          </a:bodyPr>
+          <a:lstStyle/>
+          <a:p>
+            <a:pPr algn="ctr">
+              <a:lnSpc>
+                <a:spcPts val="4759"/>
+              </a:lnSpc>
+            </a:pPr>
+            <a:r>
+              <a:rPr lang="en-US" sz="3399">
+                <a:solidFill>
+                  <a:srgbClr val="000000"/>
+                </a:solidFill>
+                <a:latin typeface="Open Sans"/>
+                <a:ea typeface="Open Sans"/>
+                <a:cs typeface="Open Sans"/>
+                <a:sym typeface="Open Sans"/>
+              </a:rPr>
+              <a:t>Comportamiento</a:t>
+            </a:r>
+          </a:p>
+        </p:txBody>
+      </p:sp>
+      <p:sp>
+        <p:nvSpPr>
+          <p:cNvPr id="8" name="TextBox 8"/>
+          <p:cNvSpPr txBox="1"/>
+          <p:nvPr/>
+        </p:nvSpPr>
+        <p:spPr>
+          <a:xfrm>
+            <a:off x="12173469" y="5511613"/>
+            <a:ext cx="2548235" cy="1180465"/>
+          </a:xfrm>
+          <a:prstGeom prst="rect">
+            <a:avLst/>
+          </a:prstGeom>
+        </p:spPr>
+        <p:txBody>
+          <a:bodyPr lIns="0" tIns="0" rIns="0" bIns="0" rtlCol="0" anchor="t">
+            <a:spAutoFit/>
+          </a:bodyPr>
+          <a:lstStyle/>
+          <a:p>
+            <a:pPr algn="ctr">
+              <a:lnSpc>
+                <a:spcPts val="4759"/>
+              </a:lnSpc>
+            </a:pPr>
+            <a:r>
+              <a:rPr lang="en-US" sz="3399">
+                <a:solidFill>
+                  <a:srgbClr val="000000"/>
+                </a:solidFill>
+                <a:latin typeface="Open Sans"/>
+                <a:ea typeface="Open Sans"/>
+                <a:cs typeface="Open Sans"/>
+                <a:sym typeface="Open Sans"/>
+              </a:rPr>
+              <a:t>Necesidades</a:t>
+            </a:r>
+          </a:p>
+          <a:p>
+            <a:pPr algn="ctr">
               <a:lnSpc>
                 <a:spcPts val="4759"/>
               </a:lnSpc>
@@ -10901,14 +10580,14 @@
       </p:sp>
       <p:sp>
         <p:nvSpPr>
-          <p:cNvPr id="10" name="TextBox 10"/>
+          <p:cNvPr id="9" name="TextBox 9"/>
           <p:cNvSpPr txBox="1"/>
           <p:nvPr/>
         </p:nvSpPr>
         <p:spPr>
           <a:xfrm>
-            <a:off x="490852" y="6877685"/>
-            <a:ext cx="3676894" cy="2980690"/>
+            <a:off x="9630515" y="1409110"/>
+            <a:ext cx="6094512" cy="2380615"/>
           </a:xfrm>
           <a:prstGeom prst="rect">
             <a:avLst/>
@@ -10920,7 +10599,7 @@
           </a:bodyPr>
           <a:lstStyle/>
           <a:p>
-            <a:pPr algn="just">
+            <a:pPr algn="l">
               <a:lnSpc>
                 <a:spcPts val="4759"/>
               </a:lnSpc>
@@ -10935,11 +10614,11 @@
                 <a:cs typeface="Open Sans"/>
                 <a:sym typeface="Open Sans"/>
               </a:rPr>
-              <a:t>Pacifico</a:t>
-            </a:r>
-          </a:p>
-          <a:p>
-            <a:pPr algn="just">
+              <a:t>63 años</a:t>
+            </a:r>
+          </a:p>
+          <a:p>
+            <a:pPr algn="l">
               <a:lnSpc>
                 <a:spcPts val="4759"/>
               </a:lnSpc>
@@ -10954,11 +10633,11 @@
                 <a:cs typeface="Open Sans"/>
                 <a:sym typeface="Open Sans"/>
               </a:rPr>
-              <a:t>Amigable</a:t>
-            </a:r>
-          </a:p>
-          <a:p>
-            <a:pPr algn="just">
+              <a:t>Viuda</a:t>
+            </a:r>
+          </a:p>
+          <a:p>
+            <a:pPr algn="l">
               <a:lnSpc>
                 <a:spcPts val="4759"/>
               </a:lnSpc>
@@ -10973,11 +10652,11 @@
                 <a:cs typeface="Open Sans"/>
                 <a:sym typeface="Open Sans"/>
               </a:rPr>
-              <a:t>Optimista</a:t>
-            </a:r>
-          </a:p>
-          <a:p>
-            <a:pPr algn="just">
+              <a:t>Vive sola con sus gatos</a:t>
+            </a:r>
+          </a:p>
+          <a:p>
+            <a:pPr algn="l">
               <a:lnSpc>
                 <a:spcPts val="4759"/>
               </a:lnSpc>
@@ -10992,11 +10671,492 @@
                 <a:cs typeface="Open Sans"/>
                 <a:sym typeface="Open Sans"/>
               </a:rPr>
-              <a:t>Trabaja en equipo</a:t>
-            </a:r>
-          </a:p>
+              <a:t>Es parte de la junta de vecinos</a:t>
+            </a:r>
+          </a:p>
+        </p:txBody>
+      </p:sp>
+      <p:sp>
+        <p:nvSpPr>
+          <p:cNvPr id="10" name="TextBox 10"/>
+          <p:cNvSpPr txBox="1"/>
+          <p:nvPr/>
+        </p:nvSpPr>
+        <p:spPr>
+          <a:xfrm>
+            <a:off x="38507" y="6834604"/>
+            <a:ext cx="2623542" cy="2380615"/>
+          </a:xfrm>
+          <a:prstGeom prst="rect">
+            <a:avLst/>
+          </a:prstGeom>
+        </p:spPr>
+        <p:txBody>
+          <a:bodyPr lIns="0" tIns="0" rIns="0" bIns="0" rtlCol="0" anchor="t">
+            <a:spAutoFit/>
+          </a:bodyPr>
+          <a:lstStyle/>
           <a:p>
             <a:pPr algn="just">
+              <a:lnSpc>
+                <a:spcPts val="4759"/>
+              </a:lnSpc>
+            </a:pPr>
+            <a:r>
+              <a:rPr lang="en-US" sz="3399">
+                <a:solidFill>
+                  <a:srgbClr val="000000"/>
+                </a:solidFill>
+                <a:latin typeface="Open Sans"/>
+                <a:ea typeface="Open Sans"/>
+                <a:cs typeface="Open Sans"/>
+                <a:sym typeface="Open Sans"/>
+              </a:rPr>
+              <a:t>Conflictiva</a:t>
+            </a:r>
+          </a:p>
+          <a:p>
+            <a:pPr algn="just">
+              <a:lnSpc>
+                <a:spcPts val="4759"/>
+              </a:lnSpc>
+            </a:pPr>
+            <a:r>
+              <a:rPr lang="en-US" sz="3399">
+                <a:solidFill>
+                  <a:srgbClr val="000000"/>
+                </a:solidFill>
+                <a:latin typeface="Open Sans"/>
+                <a:ea typeface="Open Sans"/>
+                <a:cs typeface="Open Sans"/>
+                <a:sym typeface="Open Sans"/>
+              </a:rPr>
+              <a:t>Puntual</a:t>
+            </a:r>
+          </a:p>
+          <a:p>
+            <a:pPr algn="just">
+              <a:lnSpc>
+                <a:spcPts val="4759"/>
+              </a:lnSpc>
+            </a:pPr>
+            <a:r>
+              <a:rPr lang="en-US" sz="3399">
+                <a:solidFill>
+                  <a:srgbClr val="000000"/>
+                </a:solidFill>
+                <a:latin typeface="Open Sans"/>
+                <a:ea typeface="Open Sans"/>
+                <a:cs typeface="Open Sans"/>
+                <a:sym typeface="Open Sans"/>
+              </a:rPr>
+              <a:t>Responsable</a:t>
+            </a:r>
+          </a:p>
+          <a:p>
+            <a:pPr algn="just">
+              <a:lnSpc>
+                <a:spcPts val="4759"/>
+              </a:lnSpc>
+            </a:pPr>
+            <a:r>
+              <a:rPr lang="en-US" sz="3399">
+                <a:solidFill>
+                  <a:srgbClr val="000000"/>
+                </a:solidFill>
+                <a:latin typeface="Open Sans"/>
+                <a:ea typeface="Open Sans"/>
+                <a:cs typeface="Open Sans"/>
+                <a:sym typeface="Open Sans"/>
+              </a:rPr>
+              <a:t>Observadora</a:t>
+            </a:r>
+          </a:p>
+        </p:txBody>
+      </p:sp>
+      <p:sp>
+        <p:nvSpPr>
+          <p:cNvPr id="11" name="TextBox 11"/>
+          <p:cNvSpPr txBox="1"/>
+          <p:nvPr/>
+        </p:nvSpPr>
+        <p:spPr>
+          <a:xfrm>
+            <a:off x="9264026" y="7044503"/>
+            <a:ext cx="9023974" cy="2980690"/>
+          </a:xfrm>
+          <a:prstGeom prst="rect">
+            <a:avLst/>
+          </a:prstGeom>
+        </p:spPr>
+        <p:txBody>
+          <a:bodyPr lIns="0" tIns="0" rIns="0" bIns="0" rtlCol="0" anchor="t">
+            <a:spAutoFit/>
+          </a:bodyPr>
+          <a:lstStyle/>
+          <a:p>
+            <a:pPr algn="just">
+              <a:lnSpc>
+                <a:spcPts val="4759"/>
+              </a:lnSpc>
+            </a:pPr>
+            <a:r>
+              <a:rPr lang="en-US" sz="3399">
+                <a:solidFill>
+                  <a:srgbClr val="000000"/>
+                </a:solidFill>
+                <a:latin typeface="Open Sans"/>
+                <a:ea typeface="Open Sans"/>
+                <a:cs typeface="Open Sans"/>
+                <a:sym typeface="Open Sans"/>
+              </a:rPr>
+              <a:t>No le gustan las ideas de los demas y quiere imponer su punto de vista</a:t>
+            </a:r>
+          </a:p>
+          <a:p>
+            <a:pPr algn="just">
+              <a:lnSpc>
+                <a:spcPts val="4759"/>
+              </a:lnSpc>
+            </a:pPr>
+            <a:r>
+              <a:rPr lang="en-US" sz="3399">
+                <a:solidFill>
+                  <a:srgbClr val="000000"/>
+                </a:solidFill>
+                <a:latin typeface="Open Sans"/>
+                <a:ea typeface="Open Sans"/>
+                <a:cs typeface="Open Sans"/>
+                <a:sym typeface="Open Sans"/>
+              </a:rPr>
+              <a:t>Siempre habla se queja en la junta de vecinos</a:t>
+            </a:r>
+          </a:p>
+          <a:p>
+            <a:pPr algn="just">
+              <a:lnSpc>
+                <a:spcPts val="4759"/>
+              </a:lnSpc>
+            </a:pPr>
+            <a:r>
+              <a:rPr lang="en-US" sz="3399">
+                <a:solidFill>
+                  <a:srgbClr val="000000"/>
+                </a:solidFill>
+                <a:latin typeface="Open Sans"/>
+                <a:ea typeface="Open Sans"/>
+                <a:cs typeface="Open Sans"/>
+                <a:sym typeface="Open Sans"/>
+              </a:rPr>
+              <a:t>Le gusta observar a las personas.</a:t>
+            </a:r>
+          </a:p>
+        </p:txBody>
+      </p:sp>
+    </p:spTree>
+  </p:cSld>
+  <p:clrMapOvr>
+    <a:masterClrMapping/>
+  </p:clrMapOvr>
+</p:sld>
+</file>
+
+<file path=ppt/slides/slide8.xml><?xml version="1.0" encoding="utf-8"?>
+<p:sld xmlns:a="http://schemas.openxmlformats.org/drawingml/2006/main" xmlns:r="http://schemas.openxmlformats.org/officeDocument/2006/relationships" xmlns:p="http://schemas.openxmlformats.org/presentationml/2006/main">
+  <p:cSld>
+    <p:spTree>
+      <p:nvGrpSpPr>
+        <p:cNvPr id="1" name=""/>
+        <p:cNvGrpSpPr/>
+        <p:nvPr/>
+      </p:nvGrpSpPr>
+      <p:grpSpPr>
+        <a:xfrm>
+          <a:off x="0" y="0"/>
+          <a:ext cx="0" cy="0"/>
+          <a:chOff x="0" y="0"/>
+          <a:chExt cx="0" cy="0"/>
+        </a:xfrm>
+      </p:grpSpPr>
+      <p:sp>
+        <p:nvSpPr>
+          <p:cNvPr id="2" name="AutoShape 2"/>
+          <p:cNvSpPr/>
+          <p:nvPr/>
+        </p:nvSpPr>
+        <p:spPr>
+          <a:xfrm flipV="1">
+            <a:off x="0" y="5143500"/>
+            <a:ext cx="18288000" cy="0"/>
+          </a:xfrm>
+          <a:prstGeom prst="line">
+            <a:avLst/>
+          </a:prstGeom>
+          <a:ln w="38100" cap="flat">
+            <a:solidFill>
+              <a:srgbClr val="000000"/>
+            </a:solidFill>
+            <a:prstDash val="solid"/>
+            <a:headEnd type="none" w="sm" len="sm"/>
+            <a:tailEnd type="none" w="sm" len="sm"/>
+          </a:ln>
+        </p:spPr>
+        <p:txBody>
+          <a:bodyPr/>
+          <a:lstStyle/>
+          <a:p>
+            <a:endParaRPr lang="es-CL"/>
+          </a:p>
+        </p:txBody>
+      </p:sp>
+      <p:sp>
+        <p:nvSpPr>
+          <p:cNvPr id="3" name="AutoShape 3"/>
+          <p:cNvSpPr/>
+          <p:nvPr/>
+        </p:nvSpPr>
+        <p:spPr>
+          <a:xfrm flipV="1">
+            <a:off x="9124950" y="0"/>
+            <a:ext cx="19050" cy="10287000"/>
+          </a:xfrm>
+          <a:prstGeom prst="line">
+            <a:avLst/>
+          </a:prstGeom>
+          <a:ln w="38100" cap="flat">
+            <a:solidFill>
+              <a:srgbClr val="000000"/>
+            </a:solidFill>
+            <a:prstDash val="solid"/>
+            <a:headEnd type="none" w="sm" len="sm"/>
+            <a:tailEnd type="none" w="sm" len="sm"/>
+          </a:ln>
+        </p:spPr>
+        <p:txBody>
+          <a:bodyPr/>
+          <a:lstStyle/>
+          <a:p>
+            <a:endParaRPr lang="es-CL"/>
+          </a:p>
+        </p:txBody>
+      </p:sp>
+      <p:sp>
+        <p:nvSpPr>
+          <p:cNvPr id="4" name="Freeform 4"/>
+          <p:cNvSpPr/>
+          <p:nvPr/>
+        </p:nvSpPr>
+        <p:spPr>
+          <a:xfrm>
+            <a:off x="1350278" y="1056385"/>
+            <a:ext cx="5634936" cy="3756624"/>
+          </a:xfrm>
+          <a:custGeom>
+            <a:avLst/>
+            <a:gdLst/>
+            <a:ahLst/>
+            <a:cxnLst/>
+            <a:rect l="l" t="t" r="r" b="b"/>
+            <a:pathLst>
+              <a:path w="5634936" h="3756624">
+                <a:moveTo>
+                  <a:pt x="0" y="0"/>
+                </a:moveTo>
+                <a:lnTo>
+                  <a:pt x="5634936" y="0"/>
+                </a:lnTo>
+                <a:lnTo>
+                  <a:pt x="5634936" y="3756624"/>
+                </a:lnTo>
+                <a:lnTo>
+                  <a:pt x="0" y="3756624"/>
+                </a:lnTo>
+                <a:lnTo>
+                  <a:pt x="0" y="0"/>
+                </a:lnTo>
+                <a:close/>
+              </a:path>
+            </a:pathLst>
+          </a:custGeom>
+          <a:blipFill>
+            <a:blip r:embed="rId2"/>
+            <a:stretch>
+              <a:fillRect/>
+            </a:stretch>
+          </a:blipFill>
+        </p:spPr>
+        <p:txBody>
+          <a:bodyPr/>
+          <a:lstStyle/>
+          <a:p>
+            <a:endParaRPr lang="es-CL"/>
+          </a:p>
+        </p:txBody>
+      </p:sp>
+      <p:sp>
+        <p:nvSpPr>
+          <p:cNvPr id="5" name="TextBox 5"/>
+          <p:cNvSpPr txBox="1"/>
+          <p:nvPr/>
+        </p:nvSpPr>
+        <p:spPr>
+          <a:xfrm>
+            <a:off x="2720613" y="164555"/>
+            <a:ext cx="3344317" cy="580390"/>
+          </a:xfrm>
+          <a:prstGeom prst="rect">
+            <a:avLst/>
+          </a:prstGeom>
+        </p:spPr>
+        <p:txBody>
+          <a:bodyPr lIns="0" tIns="0" rIns="0" bIns="0" rtlCol="0" anchor="t">
+            <a:spAutoFit/>
+          </a:bodyPr>
+          <a:lstStyle/>
+          <a:p>
+            <a:pPr algn="ctr">
+              <a:lnSpc>
+                <a:spcPts val="4759"/>
+              </a:lnSpc>
+            </a:pPr>
+            <a:r>
+              <a:rPr lang="en-US" sz="3399">
+                <a:solidFill>
+                  <a:srgbClr val="000000"/>
+                </a:solidFill>
+                <a:latin typeface="Open Sans"/>
+                <a:ea typeface="Open Sans"/>
+                <a:cs typeface="Open Sans"/>
+                <a:sym typeface="Open Sans"/>
+              </a:rPr>
+              <a:t>Jesus de Nazaret</a:t>
+            </a:r>
+          </a:p>
+        </p:txBody>
+      </p:sp>
+      <p:sp>
+        <p:nvSpPr>
+          <p:cNvPr id="6" name="TextBox 6"/>
+          <p:cNvSpPr txBox="1"/>
+          <p:nvPr/>
+        </p:nvSpPr>
+        <p:spPr>
+          <a:xfrm>
+            <a:off x="13096648" y="405864"/>
+            <a:ext cx="1043285" cy="580390"/>
+          </a:xfrm>
+          <a:prstGeom prst="rect">
+            <a:avLst/>
+          </a:prstGeom>
+        </p:spPr>
+        <p:txBody>
+          <a:bodyPr lIns="0" tIns="0" rIns="0" bIns="0" rtlCol="0" anchor="t">
+            <a:spAutoFit/>
+          </a:bodyPr>
+          <a:lstStyle/>
+          <a:p>
+            <a:pPr algn="ctr">
+              <a:lnSpc>
+                <a:spcPts val="4759"/>
+              </a:lnSpc>
+            </a:pPr>
+            <a:r>
+              <a:rPr lang="en-US" sz="3399">
+                <a:solidFill>
+                  <a:srgbClr val="000000"/>
+                </a:solidFill>
+                <a:latin typeface="Open Sans"/>
+                <a:ea typeface="Open Sans"/>
+                <a:cs typeface="Open Sans"/>
+                <a:sym typeface="Open Sans"/>
+              </a:rPr>
+              <a:t>Perfil</a:t>
+            </a:r>
+          </a:p>
+        </p:txBody>
+      </p:sp>
+      <p:sp>
+        <p:nvSpPr>
+          <p:cNvPr id="7" name="TextBox 7"/>
+          <p:cNvSpPr txBox="1"/>
+          <p:nvPr/>
+        </p:nvSpPr>
+        <p:spPr>
+          <a:xfrm>
+            <a:off x="2076307" y="5511613"/>
+            <a:ext cx="3460403" cy="580390"/>
+          </a:xfrm>
+          <a:prstGeom prst="rect">
+            <a:avLst/>
+          </a:prstGeom>
+        </p:spPr>
+        <p:txBody>
+          <a:bodyPr lIns="0" tIns="0" rIns="0" bIns="0" rtlCol="0" anchor="t">
+            <a:spAutoFit/>
+          </a:bodyPr>
+          <a:lstStyle/>
+          <a:p>
+            <a:pPr algn="ctr">
+              <a:lnSpc>
+                <a:spcPts val="4759"/>
+              </a:lnSpc>
+            </a:pPr>
+            <a:r>
+              <a:rPr lang="en-US" sz="3399">
+                <a:solidFill>
+                  <a:srgbClr val="000000"/>
+                </a:solidFill>
+                <a:latin typeface="Open Sans"/>
+                <a:ea typeface="Open Sans"/>
+                <a:cs typeface="Open Sans"/>
+                <a:sym typeface="Open Sans"/>
+              </a:rPr>
+              <a:t>Comportamiento</a:t>
+            </a:r>
+          </a:p>
+        </p:txBody>
+      </p:sp>
+      <p:sp>
+        <p:nvSpPr>
+          <p:cNvPr id="8" name="TextBox 8"/>
+          <p:cNvSpPr txBox="1"/>
+          <p:nvPr/>
+        </p:nvSpPr>
+        <p:spPr>
+          <a:xfrm>
+            <a:off x="12173469" y="5511613"/>
+            <a:ext cx="2548235" cy="1180465"/>
+          </a:xfrm>
+          <a:prstGeom prst="rect">
+            <a:avLst/>
+          </a:prstGeom>
+        </p:spPr>
+        <p:txBody>
+          <a:bodyPr lIns="0" tIns="0" rIns="0" bIns="0" rtlCol="0" anchor="t">
+            <a:spAutoFit/>
+          </a:bodyPr>
+          <a:lstStyle/>
+          <a:p>
+            <a:pPr algn="ctr">
+              <a:lnSpc>
+                <a:spcPts val="4759"/>
+              </a:lnSpc>
+            </a:pPr>
+            <a:r>
+              <a:rPr lang="en-US" sz="3399">
+                <a:solidFill>
+                  <a:srgbClr val="000000"/>
+                </a:solidFill>
+                <a:latin typeface="Open Sans"/>
+                <a:ea typeface="Open Sans"/>
+                <a:cs typeface="Open Sans"/>
+                <a:sym typeface="Open Sans"/>
+              </a:rPr>
+              <a:t>Necesidades</a:t>
+            </a:r>
+          </a:p>
+          <a:p>
+            <a:pPr algn="ctr">
               <a:lnSpc>
                 <a:spcPts val="4759"/>
               </a:lnSpc>
@@ -11015,6 +11175,215 @@
       </p:sp>
       <p:sp>
         <p:nvSpPr>
+          <p:cNvPr id="9" name="TextBox 9"/>
+          <p:cNvSpPr txBox="1"/>
+          <p:nvPr/>
+        </p:nvSpPr>
+        <p:spPr>
+          <a:xfrm>
+            <a:off x="9630515" y="1409110"/>
+            <a:ext cx="7311926" cy="2380615"/>
+          </a:xfrm>
+          <a:prstGeom prst="rect">
+            <a:avLst/>
+          </a:prstGeom>
+        </p:spPr>
+        <p:txBody>
+          <a:bodyPr lIns="0" tIns="0" rIns="0" bIns="0" rtlCol="0" anchor="t">
+            <a:spAutoFit/>
+          </a:bodyPr>
+          <a:lstStyle/>
+          <a:p>
+            <a:pPr algn="l">
+              <a:lnSpc>
+                <a:spcPts val="4759"/>
+              </a:lnSpc>
+            </a:pPr>
+            <a:r>
+              <a:rPr lang="en-US" sz="3399">
+                <a:solidFill>
+                  <a:srgbClr val="000000"/>
+                </a:solidFill>
+                <a:latin typeface="Open Sans"/>
+                <a:ea typeface="Open Sans"/>
+                <a:cs typeface="Open Sans"/>
+                <a:sym typeface="Open Sans"/>
+              </a:rPr>
+              <a:t>38 años</a:t>
+            </a:r>
+          </a:p>
+          <a:p>
+            <a:pPr algn="l">
+              <a:lnSpc>
+                <a:spcPts val="4759"/>
+              </a:lnSpc>
+            </a:pPr>
+            <a:r>
+              <a:rPr lang="en-US" sz="3399">
+                <a:solidFill>
+                  <a:srgbClr val="000000"/>
+                </a:solidFill>
+                <a:latin typeface="Open Sans"/>
+                <a:ea typeface="Open Sans"/>
+                <a:cs typeface="Open Sans"/>
+                <a:sym typeface="Open Sans"/>
+              </a:rPr>
+              <a:t>Casado</a:t>
+            </a:r>
+          </a:p>
+          <a:p>
+            <a:pPr algn="l">
+              <a:lnSpc>
+                <a:spcPts val="4759"/>
+              </a:lnSpc>
+            </a:pPr>
+            <a:r>
+              <a:rPr lang="en-US" sz="3399">
+                <a:solidFill>
+                  <a:srgbClr val="000000"/>
+                </a:solidFill>
+                <a:latin typeface="Open Sans"/>
+                <a:ea typeface="Open Sans"/>
+                <a:cs typeface="Open Sans"/>
+                <a:sym typeface="Open Sans"/>
+              </a:rPr>
+              <a:t>Vive con su familia y tienen un perro</a:t>
+            </a:r>
+          </a:p>
+          <a:p>
+            <a:pPr algn="l">
+              <a:lnSpc>
+                <a:spcPts val="4759"/>
+              </a:lnSpc>
+            </a:pPr>
+            <a:endParaRPr lang="en-US" sz="3399">
+              <a:solidFill>
+                <a:srgbClr val="000000"/>
+              </a:solidFill>
+              <a:latin typeface="Open Sans"/>
+              <a:ea typeface="Open Sans"/>
+              <a:cs typeface="Open Sans"/>
+              <a:sym typeface="Open Sans"/>
+            </a:endParaRPr>
+          </a:p>
+        </p:txBody>
+      </p:sp>
+      <p:sp>
+        <p:nvSpPr>
+          <p:cNvPr id="10" name="TextBox 10"/>
+          <p:cNvSpPr txBox="1"/>
+          <p:nvPr/>
+        </p:nvSpPr>
+        <p:spPr>
+          <a:xfrm>
+            <a:off x="490852" y="6877685"/>
+            <a:ext cx="3676894" cy="2980690"/>
+          </a:xfrm>
+          <a:prstGeom prst="rect">
+            <a:avLst/>
+          </a:prstGeom>
+        </p:spPr>
+        <p:txBody>
+          <a:bodyPr lIns="0" tIns="0" rIns="0" bIns="0" rtlCol="0" anchor="t">
+            <a:spAutoFit/>
+          </a:bodyPr>
+          <a:lstStyle/>
+          <a:p>
+            <a:pPr algn="just">
+              <a:lnSpc>
+                <a:spcPts val="4759"/>
+              </a:lnSpc>
+            </a:pPr>
+            <a:r>
+              <a:rPr lang="en-US" sz="3399">
+                <a:solidFill>
+                  <a:srgbClr val="000000"/>
+                </a:solidFill>
+                <a:latin typeface="Open Sans"/>
+                <a:ea typeface="Open Sans"/>
+                <a:cs typeface="Open Sans"/>
+                <a:sym typeface="Open Sans"/>
+              </a:rPr>
+              <a:t>Pacifico</a:t>
+            </a:r>
+          </a:p>
+          <a:p>
+            <a:pPr algn="just">
+              <a:lnSpc>
+                <a:spcPts val="4759"/>
+              </a:lnSpc>
+            </a:pPr>
+            <a:r>
+              <a:rPr lang="en-US" sz="3399">
+                <a:solidFill>
+                  <a:srgbClr val="000000"/>
+                </a:solidFill>
+                <a:latin typeface="Open Sans"/>
+                <a:ea typeface="Open Sans"/>
+                <a:cs typeface="Open Sans"/>
+                <a:sym typeface="Open Sans"/>
+              </a:rPr>
+              <a:t>Amigable</a:t>
+            </a:r>
+          </a:p>
+          <a:p>
+            <a:pPr algn="just">
+              <a:lnSpc>
+                <a:spcPts val="4759"/>
+              </a:lnSpc>
+            </a:pPr>
+            <a:r>
+              <a:rPr lang="en-US" sz="3399">
+                <a:solidFill>
+                  <a:srgbClr val="000000"/>
+                </a:solidFill>
+                <a:latin typeface="Open Sans"/>
+                <a:ea typeface="Open Sans"/>
+                <a:cs typeface="Open Sans"/>
+                <a:sym typeface="Open Sans"/>
+              </a:rPr>
+              <a:t>Optimista</a:t>
+            </a:r>
+          </a:p>
+          <a:p>
+            <a:pPr algn="just">
+              <a:lnSpc>
+                <a:spcPts val="4759"/>
+              </a:lnSpc>
+            </a:pPr>
+            <a:r>
+              <a:rPr lang="en-US" sz="3399">
+                <a:solidFill>
+                  <a:srgbClr val="000000"/>
+                </a:solidFill>
+                <a:latin typeface="Open Sans"/>
+                <a:ea typeface="Open Sans"/>
+                <a:cs typeface="Open Sans"/>
+                <a:sym typeface="Open Sans"/>
+              </a:rPr>
+              <a:t>Trabaja en equipo</a:t>
+            </a:r>
+          </a:p>
+          <a:p>
+            <a:pPr algn="just">
+              <a:lnSpc>
+                <a:spcPts val="4759"/>
+              </a:lnSpc>
+            </a:pPr>
+            <a:endParaRPr lang="en-US" sz="3399">
+              <a:solidFill>
+                <a:srgbClr val="000000"/>
+              </a:solidFill>
+              <a:latin typeface="Open Sans"/>
+              <a:ea typeface="Open Sans"/>
+              <a:cs typeface="Open Sans"/>
+              <a:sym typeface="Open Sans"/>
+            </a:endParaRPr>
+          </a:p>
+        </p:txBody>
+      </p:sp>
+      <p:sp>
+        <p:nvSpPr>
           <p:cNvPr id="11" name="TextBox 11"/>
           <p:cNvSpPr txBox="1"/>
           <p:nvPr/>
@@ -11074,6 +11443,66 @@
         </p:txBody>
       </p:sp>
     </p:spTree>
+  </p:cSld>
+  <p:clrMapOvr>
+    <a:masterClrMapping/>
+  </p:clrMapOvr>
+</p:sld>
+</file>
+
+<file path=ppt/slides/slide9.xml><?xml version="1.0" encoding="utf-8"?>
+<p:sld xmlns:a="http://schemas.openxmlformats.org/drawingml/2006/main" xmlns:r="http://schemas.openxmlformats.org/officeDocument/2006/relationships" xmlns:p="http://schemas.openxmlformats.org/presentationml/2006/main">
+  <p:cSld>
+    <p:spTree>
+      <p:nvGrpSpPr>
+        <p:cNvPr id="1" name=""/>
+        <p:cNvGrpSpPr/>
+        <p:nvPr/>
+      </p:nvGrpSpPr>
+      <p:grpSpPr>
+        <a:xfrm>
+          <a:off x="0" y="0"/>
+          <a:ext cx="0" cy="0"/>
+          <a:chOff x="0" y="0"/>
+          <a:chExt cx="0" cy="0"/>
+        </a:xfrm>
+      </p:grpSpPr>
+      <p:pic>
+        <p:nvPicPr>
+          <p:cNvPr id="5" name="Imagen 4">
+            <a:extLst>
+              <a:ext uri="{FF2B5EF4-FFF2-40B4-BE49-F238E27FC236}">
+                <a16:creationId xmlns:a16="http://schemas.microsoft.com/office/drawing/2014/main" id="{3FD8FC91-32F9-599B-FDAA-7A5C9C13231E}"/>
+              </a:ext>
+            </a:extLst>
+          </p:cNvPr>
+          <p:cNvPicPr>
+            <a:picLocks noChangeAspect="1"/>
+          </p:cNvPicPr>
+          <p:nvPr/>
+        </p:nvPicPr>
+        <p:blipFill>
+          <a:blip r:embed="rId2"/>
+          <a:stretch>
+            <a:fillRect/>
+          </a:stretch>
+        </p:blipFill>
+        <p:spPr>
+          <a:xfrm>
+            <a:off x="3429000" y="1333500"/>
+            <a:ext cx="11647922" cy="7848600"/>
+          </a:xfrm>
+          <a:prstGeom prst="rect">
+            <a:avLst/>
+          </a:prstGeom>
+        </p:spPr>
+      </p:pic>
+    </p:spTree>
+    <p:extLst>
+      <p:ext uri="{BB962C8B-B14F-4D97-AF65-F5344CB8AC3E}">
+        <p14:creationId xmlns:p14="http://schemas.microsoft.com/office/powerpoint/2010/main" val="126829499"/>
+      </p:ext>
+    </p:extLst>
   </p:cSld>
   <p:clrMapOvr>
     <a:masterClrMapping/>

</xml_diff>